<commit_message>
amélioration du chapitre IV
</commit_message>
<xml_diff>
--- a/CH4. Simulation de l'effet Morton/figures/figures.pptx
+++ b/CH4. Simulation de l'effet Morton/figures/figures.pptx
@@ -6,6 +6,7 @@
   </p:sldMasterIdLst>
   <p:sldIdLst>
     <p:sldId id="256" r:id="rId2"/>
+    <p:sldId id="257" r:id="rId3"/>
   </p:sldIdLst>
   <p:sldSz cx="12192000" cy="6858000"/>
   <p:notesSz cx="6858000" cy="9144000"/>
@@ -104,6 +105,11 @@
       </a:defRPr>
     </a:lvl9pPr>
   </p:defaultTextStyle>
+  <p:extLst>
+    <p:ext uri="{EFAFB233-063F-42B5-8137-9DF3F51BA10A}">
+      <p15:sldGuideLst xmlns:p15="http://schemas.microsoft.com/office/powerpoint/2012/main"/>
+    </p:ext>
+  </p:extLst>
 </p:presentation>
 </file>
 
@@ -238,7 +244,7 @@
           <a:p>
             <a:fld id="{D37BA788-077B-42A1-A7FD-B2F030396A60}" type="datetimeFigureOut">
               <a:rPr lang="en-US" smtClean="0"/>
-              <a:t>12/23/2018</a:t>
+              <a:t>12/24/2018</a:t>
             </a:fld>
             <a:endParaRPr lang="en-US"/>
           </a:p>
@@ -408,7 +414,7 @@
           <a:p>
             <a:fld id="{D37BA788-077B-42A1-A7FD-B2F030396A60}" type="datetimeFigureOut">
               <a:rPr lang="en-US" smtClean="0"/>
-              <a:t>12/23/2018</a:t>
+              <a:t>12/24/2018</a:t>
             </a:fld>
             <a:endParaRPr lang="en-US"/>
           </a:p>
@@ -588,7 +594,7 @@
           <a:p>
             <a:fld id="{D37BA788-077B-42A1-A7FD-B2F030396A60}" type="datetimeFigureOut">
               <a:rPr lang="en-US" smtClean="0"/>
-              <a:t>12/23/2018</a:t>
+              <a:t>12/24/2018</a:t>
             </a:fld>
             <a:endParaRPr lang="en-US"/>
           </a:p>
@@ -758,7 +764,7 @@
           <a:p>
             <a:fld id="{D37BA788-077B-42A1-A7FD-B2F030396A60}" type="datetimeFigureOut">
               <a:rPr lang="en-US" smtClean="0"/>
-              <a:t>12/23/2018</a:t>
+              <a:t>12/24/2018</a:t>
             </a:fld>
             <a:endParaRPr lang="en-US"/>
           </a:p>
@@ -1004,7 +1010,7 @@
           <a:p>
             <a:fld id="{D37BA788-077B-42A1-A7FD-B2F030396A60}" type="datetimeFigureOut">
               <a:rPr lang="en-US" smtClean="0"/>
-              <a:t>12/23/2018</a:t>
+              <a:t>12/24/2018</a:t>
             </a:fld>
             <a:endParaRPr lang="en-US"/>
           </a:p>
@@ -1236,7 +1242,7 @@
           <a:p>
             <a:fld id="{D37BA788-077B-42A1-A7FD-B2F030396A60}" type="datetimeFigureOut">
               <a:rPr lang="en-US" smtClean="0"/>
-              <a:t>12/23/2018</a:t>
+              <a:t>12/24/2018</a:t>
             </a:fld>
             <a:endParaRPr lang="en-US"/>
           </a:p>
@@ -1603,7 +1609,7 @@
           <a:p>
             <a:fld id="{D37BA788-077B-42A1-A7FD-B2F030396A60}" type="datetimeFigureOut">
               <a:rPr lang="en-US" smtClean="0"/>
-              <a:t>12/23/2018</a:t>
+              <a:t>12/24/2018</a:t>
             </a:fld>
             <a:endParaRPr lang="en-US"/>
           </a:p>
@@ -1721,7 +1727,7 @@
           <a:p>
             <a:fld id="{D37BA788-077B-42A1-A7FD-B2F030396A60}" type="datetimeFigureOut">
               <a:rPr lang="en-US" smtClean="0"/>
-              <a:t>12/23/2018</a:t>
+              <a:t>12/24/2018</a:t>
             </a:fld>
             <a:endParaRPr lang="en-US"/>
           </a:p>
@@ -1816,7 +1822,7 @@
           <a:p>
             <a:fld id="{D37BA788-077B-42A1-A7FD-B2F030396A60}" type="datetimeFigureOut">
               <a:rPr lang="en-US" smtClean="0"/>
-              <a:t>12/23/2018</a:t>
+              <a:t>12/24/2018</a:t>
             </a:fld>
             <a:endParaRPr lang="en-US"/>
           </a:p>
@@ -2093,7 +2099,7 @@
           <a:p>
             <a:fld id="{D37BA788-077B-42A1-A7FD-B2F030396A60}" type="datetimeFigureOut">
               <a:rPr lang="en-US" smtClean="0"/>
-              <a:t>12/23/2018</a:t>
+              <a:t>12/24/2018</a:t>
             </a:fld>
             <a:endParaRPr lang="en-US"/>
           </a:p>
@@ -2346,7 +2352,7 @@
           <a:p>
             <a:fld id="{D37BA788-077B-42A1-A7FD-B2F030396A60}" type="datetimeFigureOut">
               <a:rPr lang="en-US" smtClean="0"/>
-              <a:t>12/23/2018</a:t>
+              <a:t>12/24/2018</a:t>
             </a:fld>
             <a:endParaRPr lang="en-US"/>
           </a:p>
@@ -2559,7 +2565,7 @@
           <a:p>
             <a:fld id="{D37BA788-077B-42A1-A7FD-B2F030396A60}" type="datetimeFigureOut">
               <a:rPr lang="en-US" smtClean="0"/>
-              <a:t>12/23/2018</a:t>
+              <a:t>12/24/2018</a:t>
             </a:fld>
             <a:endParaRPr lang="en-US"/>
           </a:p>
@@ -3033,12 +3039,12 @@
                         </a:spcAft>
                       </a:pPr>
                       <a:r>
-                        <a:rPr lang="fr-FR" sz="1200">
+                        <a:rPr lang="fr-FR" sz="1200" dirty="0">
                           <a:effectLst/>
                         </a:rPr>
                         <a:t>Type de palier</a:t>
                       </a:r>
-                      <a:endParaRPr lang="en-US" sz="1200">
+                      <a:endParaRPr lang="en-US" sz="1200" dirty="0">
                         <a:effectLst/>
                         <a:latin typeface="Calibri" panose="020F0502020204030204" pitchFamily="34" charset="0"/>
                         <a:ea typeface="Times New Roman" panose="02020603050405020304" pitchFamily="18" charset="0"/>
@@ -3156,12 +3162,12 @@
                         </a:spcAft>
                       </a:pPr>
                       <a:r>
-                        <a:rPr lang="fr-FR" sz="1200">
+                        <a:rPr lang="fr-FR" sz="1200" dirty="0">
                           <a:effectLst/>
                         </a:rPr>
                         <a:t>Diamètre</a:t>
                       </a:r>
-                      <a:endParaRPr lang="en-US" sz="1200">
+                      <a:endParaRPr lang="en-US" sz="1200" dirty="0">
                         <a:effectLst/>
                         <a:latin typeface="Calibri" panose="020F0502020204030204" pitchFamily="34" charset="0"/>
                         <a:ea typeface="Times New Roman" panose="02020603050405020304" pitchFamily="18" charset="0"/>
@@ -3270,12 +3276,12 @@
                         </a:spcAft>
                       </a:pPr>
                       <a:r>
-                        <a:rPr lang="fr-FR" sz="1200">
+                        <a:rPr lang="fr-FR" sz="1200" dirty="0">
                           <a:effectLst/>
                         </a:rPr>
                         <a:t>15 mm </a:t>
                       </a:r>
-                      <a:endParaRPr lang="en-US" sz="1200">
+                      <a:endParaRPr lang="en-US" sz="1200" dirty="0">
                         <a:effectLst/>
                         <a:latin typeface="Calibri" panose="020F0502020204030204" pitchFamily="34" charset="0"/>
                         <a:ea typeface="Times New Roman" panose="02020603050405020304" pitchFamily="18" charset="0"/>
@@ -3299,12 +3305,12 @@
                         </a:spcAft>
                       </a:pPr>
                       <a:r>
-                        <a:rPr lang="fr-FR" sz="1200">
+                        <a:rPr lang="fr-FR" sz="1200" dirty="0">
                           <a:effectLst/>
                         </a:rPr>
                         <a:t>Distance du plan de capteur DE au centre du palier</a:t>
                       </a:r>
-                      <a:endParaRPr lang="en-US" sz="1200">
+                      <a:endParaRPr lang="en-US" sz="1200" dirty="0">
                         <a:effectLst/>
                         <a:latin typeface="Calibri" panose="020F0502020204030204" pitchFamily="34" charset="0"/>
                         <a:ea typeface="Times New Roman" panose="02020603050405020304" pitchFamily="18" charset="0"/>
@@ -3393,12 +3399,12 @@
                         </a:spcAft>
                       </a:pPr>
                       <a:r>
-                        <a:rPr lang="fr-FR" sz="1200">
+                        <a:rPr lang="fr-FR" sz="1200" dirty="0">
                           <a:effectLst/>
                         </a:rPr>
                         <a:t>0.33</a:t>
                       </a:r>
-                      <a:endParaRPr lang="en-US" sz="1200">
+                      <a:endParaRPr lang="en-US" sz="1200" dirty="0">
                         <a:effectLst/>
                         <a:latin typeface="Calibri" panose="020F0502020204030204" pitchFamily="34" charset="0"/>
                         <a:ea typeface="Times New Roman" panose="02020603050405020304" pitchFamily="18" charset="0"/>
@@ -3478,12 +3484,12 @@
                         </a:spcAft>
                       </a:pPr>
                       <a:r>
-                        <a:rPr lang="fr-FR" sz="1200">
+                        <a:rPr lang="fr-FR" sz="1200" dirty="0">
                           <a:effectLst/>
                         </a:rPr>
                         <a:t>50 µm</a:t>
                       </a:r>
-                      <a:endParaRPr lang="en-US" sz="1200">
+                      <a:endParaRPr lang="en-US" sz="1200" dirty="0">
                         <a:effectLst/>
                         <a:latin typeface="Calibri" panose="020F0502020204030204" pitchFamily="34" charset="0"/>
                         <a:ea typeface="Times New Roman" panose="02020603050405020304" pitchFamily="18" charset="0"/>
@@ -3601,12 +3607,12 @@
                         </a:spcAft>
                       </a:pPr>
                       <a:r>
-                        <a:rPr lang="fr-FR" sz="1200">
+                        <a:rPr lang="fr-FR" sz="1200" dirty="0">
                           <a:effectLst/>
                         </a:rPr>
                         <a:t>ISO VG 32</a:t>
                       </a:r>
-                      <a:endParaRPr lang="en-US" sz="1200">
+                      <a:endParaRPr lang="en-US" sz="1200" dirty="0">
                         <a:effectLst/>
                         <a:latin typeface="Calibri" panose="020F0502020204030204" pitchFamily="34" charset="0"/>
                         <a:ea typeface="Times New Roman" panose="02020603050405020304" pitchFamily="18" charset="0"/>
@@ -3981,6 +3987,2133 @@
     <p:extLst>
       <p:ext uri="{BB962C8B-B14F-4D97-AF65-F5344CB8AC3E}">
         <p14:creationId xmlns:p14="http://schemas.microsoft.com/office/powerpoint/2010/main" val="489244736"/>
+      </p:ext>
+    </p:extLst>
+  </p:cSld>
+  <p:clrMapOvr>
+    <a:masterClrMapping/>
+  </p:clrMapOvr>
+</p:sld>
+</file>
+
+<file path=ppt/slides/slide2.xml><?xml version="1.0" encoding="utf-8"?>
+<p:sld xmlns:a="http://schemas.openxmlformats.org/drawingml/2006/main" xmlns:r="http://schemas.openxmlformats.org/officeDocument/2006/relationships" xmlns:p="http://schemas.openxmlformats.org/presentationml/2006/main">
+  <p:cSld>
+    <p:spTree>
+      <p:nvGrpSpPr>
+        <p:cNvPr id="1" name=""/>
+        <p:cNvGrpSpPr/>
+        <p:nvPr/>
+      </p:nvGrpSpPr>
+      <p:grpSpPr>
+        <a:xfrm>
+          <a:off x="0" y="0"/>
+          <a:ext cx="0" cy="0"/>
+          <a:chOff x="0" y="0"/>
+          <a:chExt cx="0" cy="0"/>
+        </a:xfrm>
+      </p:grpSpPr>
+      <p:graphicFrame>
+        <p:nvGraphicFramePr>
+          <p:cNvPr id="4" name="Tableau 3"/>
+          <p:cNvGraphicFramePr>
+            <a:graphicFrameLocks noGrp="1"/>
+          </p:cNvGraphicFramePr>
+          <p:nvPr>
+            <p:extLst>
+              <p:ext uri="{D42A27DB-BD31-4B8C-83A1-F6EECF244321}">
+                <p14:modId xmlns:p14="http://schemas.microsoft.com/office/powerpoint/2010/main" val="327093770"/>
+              </p:ext>
+            </p:extLst>
+          </p:nvPr>
+        </p:nvGraphicFramePr>
+        <p:xfrm>
+          <a:off x="1090246" y="944737"/>
+          <a:ext cx="3385062" cy="1207008"/>
+        </p:xfrm>
+        <a:graphic>
+          <a:graphicData uri="http://schemas.openxmlformats.org/drawingml/2006/table">
+            <a:tbl>
+              <a:tblPr firstRow="1" firstCol="1" bandRow="1">
+                <a:tableStyleId>{5C22544A-7EE6-4342-B048-85BDC9FD1C3A}</a:tableStyleId>
+              </a:tblPr>
+              <a:tblGrid>
+                <a:gridCol w="1732085">
+                  <a:extLst>
+                    <a:ext uri="{9D8B030D-6E8A-4147-A177-3AD203B41FA5}">
+                      <a16:colId xmlns:a16="http://schemas.microsoft.com/office/drawing/2014/main" val="1694900445"/>
+                    </a:ext>
+                  </a:extLst>
+                </a:gridCol>
+                <a:gridCol w="1652977">
+                  <a:extLst>
+                    <a:ext uri="{9D8B030D-6E8A-4147-A177-3AD203B41FA5}">
+                      <a16:colId xmlns:a16="http://schemas.microsoft.com/office/drawing/2014/main" val="3264982421"/>
+                    </a:ext>
+                  </a:extLst>
+                </a:gridCol>
+              </a:tblGrid>
+              <a:tr h="189230">
+                <a:tc>
+                  <a:txBody>
+                    <a:bodyPr/>
+                    <a:lstStyle/>
+                    <a:p>
+                      <a:pPr>
+                        <a:lnSpc>
+                          <a:spcPct val="120000"/>
+                        </a:lnSpc>
+                        <a:spcAft>
+                          <a:spcPts val="0"/>
+                        </a:spcAft>
+                      </a:pPr>
+                      <a:r>
+                        <a:rPr lang="fr-FR" sz="1100" dirty="0">
+                          <a:effectLst/>
+                        </a:rPr>
+                        <a:t>Type de palier</a:t>
+                      </a:r>
+                      <a:endParaRPr lang="en-US" sz="1100" dirty="0">
+                        <a:effectLst/>
+                        <a:latin typeface="Calibri" panose="020F0502020204030204" pitchFamily="34" charset="0"/>
+                        <a:ea typeface="宋体" panose="02010600030101010101" pitchFamily="2" charset="-122"/>
+                        <a:cs typeface="Times New Roman" panose="02020603050405020304" pitchFamily="18" charset="0"/>
+                      </a:endParaRPr>
+                    </a:p>
+                  </a:txBody>
+                  <a:tcPr marL="44450" marR="44450" marT="0" marB="0" anchor="ctr"/>
+                </a:tc>
+                <a:tc>
+                  <a:txBody>
+                    <a:bodyPr/>
+                    <a:lstStyle/>
+                    <a:p>
+                      <a:pPr>
+                        <a:lnSpc>
+                          <a:spcPct val="120000"/>
+                        </a:lnSpc>
+                        <a:spcAft>
+                          <a:spcPts val="0"/>
+                        </a:spcAft>
+                      </a:pPr>
+                      <a:r>
+                        <a:rPr lang="fr-FR" sz="1100" dirty="0">
+                          <a:effectLst/>
+                        </a:rPr>
+                        <a:t>Palier lisse </a:t>
+                      </a:r>
+                      <a:r>
+                        <a:rPr lang="fr-FR" sz="1100" dirty="0" smtClean="0">
+                          <a:effectLst/>
+                        </a:rPr>
+                        <a:t>circulaire</a:t>
+                      </a:r>
+                      <a:endParaRPr lang="en-US" sz="1100" dirty="0">
+                        <a:effectLst/>
+                        <a:latin typeface="Calibri" panose="020F0502020204030204" pitchFamily="34" charset="0"/>
+                        <a:ea typeface="宋体" panose="02010600030101010101" pitchFamily="2" charset="-122"/>
+                        <a:cs typeface="Times New Roman" panose="02020603050405020304" pitchFamily="18" charset="0"/>
+                      </a:endParaRPr>
+                    </a:p>
+                  </a:txBody>
+                  <a:tcPr marL="44450" marR="44450" marT="0" marB="0" anchor="ctr"/>
+                </a:tc>
+                <a:extLst>
+                  <a:ext uri="{0D108BD9-81ED-4DB2-BD59-A6C34878D82A}">
+                    <a16:rowId xmlns:a16="http://schemas.microsoft.com/office/drawing/2014/main" val="3577080247"/>
+                  </a:ext>
+                </a:extLst>
+              </a:tr>
+              <a:tr h="189230">
+                <a:tc>
+                  <a:txBody>
+                    <a:bodyPr/>
+                    <a:lstStyle/>
+                    <a:p>
+                      <a:pPr>
+                        <a:lnSpc>
+                          <a:spcPct val="120000"/>
+                        </a:lnSpc>
+                        <a:spcAft>
+                          <a:spcPts val="0"/>
+                        </a:spcAft>
+                      </a:pPr>
+                      <a:r>
+                        <a:rPr lang="fr-FR" sz="1100" dirty="0">
+                          <a:effectLst/>
+                        </a:rPr>
+                        <a:t>Diamètre</a:t>
+                      </a:r>
+                      <a:endParaRPr lang="en-US" sz="1100" dirty="0">
+                        <a:effectLst/>
+                        <a:latin typeface="Calibri" panose="020F0502020204030204" pitchFamily="34" charset="0"/>
+                        <a:ea typeface="宋体" panose="02010600030101010101" pitchFamily="2" charset="-122"/>
+                        <a:cs typeface="Times New Roman" panose="02020603050405020304" pitchFamily="18" charset="0"/>
+                      </a:endParaRPr>
+                    </a:p>
+                  </a:txBody>
+                  <a:tcPr marL="44450" marR="44450" marT="0" marB="0" anchor="ctr"/>
+                </a:tc>
+                <a:tc>
+                  <a:txBody>
+                    <a:bodyPr/>
+                    <a:lstStyle/>
+                    <a:p>
+                      <a:pPr>
+                        <a:lnSpc>
+                          <a:spcPct val="120000"/>
+                        </a:lnSpc>
+                        <a:spcAft>
+                          <a:spcPts val="0"/>
+                        </a:spcAft>
+                      </a:pPr>
+                      <a:r>
+                        <a:rPr lang="fr-FR" sz="1100">
+                          <a:effectLst/>
+                        </a:rPr>
+                        <a:t>Ø45 mm</a:t>
+                      </a:r>
+                      <a:endParaRPr lang="en-US" sz="1100">
+                        <a:effectLst/>
+                        <a:latin typeface="Calibri" panose="020F0502020204030204" pitchFamily="34" charset="0"/>
+                        <a:ea typeface="宋体" panose="02010600030101010101" pitchFamily="2" charset="-122"/>
+                        <a:cs typeface="Times New Roman" panose="02020603050405020304" pitchFamily="18" charset="0"/>
+                      </a:endParaRPr>
+                    </a:p>
+                  </a:txBody>
+                  <a:tcPr marL="44450" marR="44450" marT="0" marB="0" anchor="ctr"/>
+                </a:tc>
+                <a:extLst>
+                  <a:ext uri="{0D108BD9-81ED-4DB2-BD59-A6C34878D82A}">
+                    <a16:rowId xmlns:a16="http://schemas.microsoft.com/office/drawing/2014/main" val="2567957476"/>
+                  </a:ext>
+                </a:extLst>
+              </a:tr>
+              <a:tr h="189230">
+                <a:tc>
+                  <a:txBody>
+                    <a:bodyPr/>
+                    <a:lstStyle/>
+                    <a:p>
+                      <a:pPr>
+                        <a:lnSpc>
+                          <a:spcPct val="120000"/>
+                        </a:lnSpc>
+                        <a:spcAft>
+                          <a:spcPts val="0"/>
+                        </a:spcAft>
+                      </a:pPr>
+                      <a:r>
+                        <a:rPr lang="fr-FR" sz="1100" dirty="0">
+                          <a:effectLst/>
+                        </a:rPr>
+                        <a:t>Longueur</a:t>
+                      </a:r>
+                      <a:endParaRPr lang="en-US" sz="1100" dirty="0">
+                        <a:effectLst/>
+                        <a:latin typeface="Calibri" panose="020F0502020204030204" pitchFamily="34" charset="0"/>
+                        <a:ea typeface="宋体" panose="02010600030101010101" pitchFamily="2" charset="-122"/>
+                        <a:cs typeface="Times New Roman" panose="02020603050405020304" pitchFamily="18" charset="0"/>
+                      </a:endParaRPr>
+                    </a:p>
+                  </a:txBody>
+                  <a:tcPr marL="44450" marR="44450" marT="0" marB="0" anchor="ctr"/>
+                </a:tc>
+                <a:tc>
+                  <a:txBody>
+                    <a:bodyPr/>
+                    <a:lstStyle/>
+                    <a:p>
+                      <a:pPr>
+                        <a:lnSpc>
+                          <a:spcPct val="120000"/>
+                        </a:lnSpc>
+                        <a:spcAft>
+                          <a:spcPts val="0"/>
+                        </a:spcAft>
+                      </a:pPr>
+                      <a:r>
+                        <a:rPr lang="fr-FR" sz="1100" dirty="0">
+                          <a:effectLst/>
+                        </a:rPr>
+                        <a:t>15 mm </a:t>
+                      </a:r>
+                      <a:endParaRPr lang="en-US" sz="1100" dirty="0">
+                        <a:effectLst/>
+                        <a:latin typeface="Calibri" panose="020F0502020204030204" pitchFamily="34" charset="0"/>
+                        <a:ea typeface="宋体" panose="02010600030101010101" pitchFamily="2" charset="-122"/>
+                        <a:cs typeface="Times New Roman" panose="02020603050405020304" pitchFamily="18" charset="0"/>
+                      </a:endParaRPr>
+                    </a:p>
+                  </a:txBody>
+                  <a:tcPr marL="44450" marR="44450" marT="0" marB="0" anchor="ctr"/>
+                </a:tc>
+                <a:extLst>
+                  <a:ext uri="{0D108BD9-81ED-4DB2-BD59-A6C34878D82A}">
+                    <a16:rowId xmlns:a16="http://schemas.microsoft.com/office/drawing/2014/main" val="398819589"/>
+                  </a:ext>
+                </a:extLst>
+              </a:tr>
+              <a:tr h="189230">
+                <a:tc>
+                  <a:txBody>
+                    <a:bodyPr/>
+                    <a:lstStyle/>
+                    <a:p>
+                      <a:pPr>
+                        <a:lnSpc>
+                          <a:spcPct val="120000"/>
+                        </a:lnSpc>
+                        <a:spcAft>
+                          <a:spcPts val="0"/>
+                        </a:spcAft>
+                      </a:pPr>
+                      <a:r>
+                        <a:rPr lang="fr-FR" sz="1100">
+                          <a:effectLst/>
+                        </a:rPr>
+                        <a:t>Rapport L/D</a:t>
+                      </a:r>
+                      <a:endParaRPr lang="en-US" sz="1100">
+                        <a:effectLst/>
+                        <a:latin typeface="Calibri" panose="020F0502020204030204" pitchFamily="34" charset="0"/>
+                        <a:ea typeface="宋体" panose="02010600030101010101" pitchFamily="2" charset="-122"/>
+                        <a:cs typeface="Times New Roman" panose="02020603050405020304" pitchFamily="18" charset="0"/>
+                      </a:endParaRPr>
+                    </a:p>
+                  </a:txBody>
+                  <a:tcPr marL="44450" marR="44450" marT="0" marB="0" anchor="ctr"/>
+                </a:tc>
+                <a:tc>
+                  <a:txBody>
+                    <a:bodyPr/>
+                    <a:lstStyle/>
+                    <a:p>
+                      <a:pPr>
+                        <a:lnSpc>
+                          <a:spcPct val="120000"/>
+                        </a:lnSpc>
+                        <a:spcAft>
+                          <a:spcPts val="0"/>
+                        </a:spcAft>
+                      </a:pPr>
+                      <a:r>
+                        <a:rPr lang="fr-FR" sz="1100" dirty="0">
+                          <a:effectLst/>
+                        </a:rPr>
+                        <a:t>0.33</a:t>
+                      </a:r>
+                      <a:endParaRPr lang="en-US" sz="1100" dirty="0">
+                        <a:effectLst/>
+                        <a:latin typeface="Calibri" panose="020F0502020204030204" pitchFamily="34" charset="0"/>
+                        <a:ea typeface="宋体" panose="02010600030101010101" pitchFamily="2" charset="-122"/>
+                        <a:cs typeface="Times New Roman" panose="02020603050405020304" pitchFamily="18" charset="0"/>
+                      </a:endParaRPr>
+                    </a:p>
+                  </a:txBody>
+                  <a:tcPr marL="44450" marR="44450" marT="0" marB="0" anchor="ctr"/>
+                </a:tc>
+                <a:extLst>
+                  <a:ext uri="{0D108BD9-81ED-4DB2-BD59-A6C34878D82A}">
+                    <a16:rowId xmlns:a16="http://schemas.microsoft.com/office/drawing/2014/main" val="3084963078"/>
+                  </a:ext>
+                </a:extLst>
+              </a:tr>
+              <a:tr h="189230">
+                <a:tc>
+                  <a:txBody>
+                    <a:bodyPr/>
+                    <a:lstStyle/>
+                    <a:p>
+                      <a:pPr>
+                        <a:lnSpc>
+                          <a:spcPct val="120000"/>
+                        </a:lnSpc>
+                        <a:spcAft>
+                          <a:spcPts val="0"/>
+                        </a:spcAft>
+                      </a:pPr>
+                      <a:r>
+                        <a:rPr lang="fr-FR" sz="1100">
+                          <a:effectLst/>
+                        </a:rPr>
+                        <a:t>Jeu radial théorique</a:t>
+                      </a:r>
+                      <a:endParaRPr lang="en-US" sz="1100">
+                        <a:effectLst/>
+                        <a:latin typeface="Calibri" panose="020F0502020204030204" pitchFamily="34" charset="0"/>
+                        <a:ea typeface="宋体" panose="02010600030101010101" pitchFamily="2" charset="-122"/>
+                        <a:cs typeface="Times New Roman" panose="02020603050405020304" pitchFamily="18" charset="0"/>
+                      </a:endParaRPr>
+                    </a:p>
+                  </a:txBody>
+                  <a:tcPr marL="44450" marR="44450" marT="0" marB="0" anchor="ctr"/>
+                </a:tc>
+                <a:tc>
+                  <a:txBody>
+                    <a:bodyPr/>
+                    <a:lstStyle/>
+                    <a:p>
+                      <a:pPr>
+                        <a:lnSpc>
+                          <a:spcPct val="120000"/>
+                        </a:lnSpc>
+                        <a:spcAft>
+                          <a:spcPts val="0"/>
+                        </a:spcAft>
+                      </a:pPr>
+                      <a:r>
+                        <a:rPr lang="fr-FR" sz="1100" dirty="0">
+                          <a:effectLst/>
+                        </a:rPr>
+                        <a:t>50 µm</a:t>
+                      </a:r>
+                      <a:endParaRPr lang="en-US" sz="1100" dirty="0">
+                        <a:effectLst/>
+                        <a:latin typeface="Calibri" panose="020F0502020204030204" pitchFamily="34" charset="0"/>
+                        <a:ea typeface="宋体" panose="02010600030101010101" pitchFamily="2" charset="-122"/>
+                        <a:cs typeface="Times New Roman" panose="02020603050405020304" pitchFamily="18" charset="0"/>
+                      </a:endParaRPr>
+                    </a:p>
+                  </a:txBody>
+                  <a:tcPr marL="44450" marR="44450" marT="0" marB="0" anchor="ctr"/>
+                </a:tc>
+                <a:extLst>
+                  <a:ext uri="{0D108BD9-81ED-4DB2-BD59-A6C34878D82A}">
+                    <a16:rowId xmlns:a16="http://schemas.microsoft.com/office/drawing/2014/main" val="1233433992"/>
+                  </a:ext>
+                </a:extLst>
+              </a:tr>
+              <a:tr h="189230">
+                <a:tc>
+                  <a:txBody>
+                    <a:bodyPr/>
+                    <a:lstStyle/>
+                    <a:p>
+                      <a:pPr>
+                        <a:lnSpc>
+                          <a:spcPct val="120000"/>
+                        </a:lnSpc>
+                        <a:spcAft>
+                          <a:spcPts val="0"/>
+                        </a:spcAft>
+                      </a:pPr>
+                      <a:r>
+                        <a:rPr lang="fr-FR" sz="1100">
+                          <a:effectLst/>
+                        </a:rPr>
+                        <a:t>Lubrifiant</a:t>
+                      </a:r>
+                      <a:endParaRPr lang="en-US" sz="1100">
+                        <a:effectLst/>
+                        <a:latin typeface="Calibri" panose="020F0502020204030204" pitchFamily="34" charset="0"/>
+                        <a:ea typeface="宋体" panose="02010600030101010101" pitchFamily="2" charset="-122"/>
+                        <a:cs typeface="Times New Roman" panose="02020603050405020304" pitchFamily="18" charset="0"/>
+                      </a:endParaRPr>
+                    </a:p>
+                  </a:txBody>
+                  <a:tcPr marL="44450" marR="44450" marT="0" marB="0" anchor="ctr"/>
+                </a:tc>
+                <a:tc>
+                  <a:txBody>
+                    <a:bodyPr/>
+                    <a:lstStyle/>
+                    <a:p>
+                      <a:pPr>
+                        <a:lnSpc>
+                          <a:spcPct val="120000"/>
+                        </a:lnSpc>
+                        <a:spcAft>
+                          <a:spcPts val="0"/>
+                        </a:spcAft>
+                      </a:pPr>
+                      <a:r>
+                        <a:rPr lang="fr-FR" sz="1100" dirty="0">
+                          <a:effectLst/>
+                        </a:rPr>
+                        <a:t>ISO VG 32</a:t>
+                      </a:r>
+                      <a:endParaRPr lang="en-US" sz="1100" dirty="0">
+                        <a:effectLst/>
+                        <a:latin typeface="Calibri" panose="020F0502020204030204" pitchFamily="34" charset="0"/>
+                        <a:ea typeface="宋体" panose="02010600030101010101" pitchFamily="2" charset="-122"/>
+                        <a:cs typeface="Times New Roman" panose="02020603050405020304" pitchFamily="18" charset="0"/>
+                      </a:endParaRPr>
+                    </a:p>
+                  </a:txBody>
+                  <a:tcPr marL="44450" marR="44450" marT="0" marB="0" anchor="ctr"/>
+                </a:tc>
+                <a:extLst>
+                  <a:ext uri="{0D108BD9-81ED-4DB2-BD59-A6C34878D82A}">
+                    <a16:rowId xmlns:a16="http://schemas.microsoft.com/office/drawing/2014/main" val="3587865109"/>
+                  </a:ext>
+                </a:extLst>
+              </a:tr>
+            </a:tbl>
+          </a:graphicData>
+        </a:graphic>
+      </p:graphicFrame>
+      <p:graphicFrame>
+        <p:nvGraphicFramePr>
+          <p:cNvPr id="5" name="Tableau 4"/>
+          <p:cNvGraphicFramePr>
+            <a:graphicFrameLocks noGrp="1"/>
+          </p:cNvGraphicFramePr>
+          <p:nvPr>
+            <p:extLst>
+              <p:ext uri="{D42A27DB-BD31-4B8C-83A1-F6EECF244321}">
+                <p14:modId xmlns:p14="http://schemas.microsoft.com/office/powerpoint/2010/main" val="987910138"/>
+              </p:ext>
+            </p:extLst>
+          </p:nvPr>
+        </p:nvGraphicFramePr>
+        <p:xfrm>
+          <a:off x="5662881" y="1811216"/>
+          <a:ext cx="4189730" cy="2771190"/>
+        </p:xfrm>
+        <a:graphic>
+          <a:graphicData uri="http://schemas.openxmlformats.org/drawingml/2006/table">
+            <a:tbl>
+              <a:tblPr firstRow="1" firstCol="1" bandRow="1">
+                <a:tableStyleId>{5C22544A-7EE6-4342-B048-85BDC9FD1C3A}</a:tableStyleId>
+              </a:tblPr>
+              <a:tblGrid>
+                <a:gridCol w="1092200">
+                  <a:extLst>
+                    <a:ext uri="{9D8B030D-6E8A-4147-A177-3AD203B41FA5}">
+                      <a16:colId xmlns:a16="http://schemas.microsoft.com/office/drawing/2014/main" val="2721790737"/>
+                    </a:ext>
+                  </a:extLst>
+                </a:gridCol>
+                <a:gridCol w="1104900">
+                  <a:extLst>
+                    <a:ext uri="{9D8B030D-6E8A-4147-A177-3AD203B41FA5}">
+                      <a16:colId xmlns:a16="http://schemas.microsoft.com/office/drawing/2014/main" val="795809941"/>
+                    </a:ext>
+                  </a:extLst>
+                </a:gridCol>
+                <a:gridCol w="889000">
+                  <a:extLst>
+                    <a:ext uri="{9D8B030D-6E8A-4147-A177-3AD203B41FA5}">
+                      <a16:colId xmlns:a16="http://schemas.microsoft.com/office/drawing/2014/main" val="2393867692"/>
+                    </a:ext>
+                  </a:extLst>
+                </a:gridCol>
+                <a:gridCol w="1103630">
+                  <a:extLst>
+                    <a:ext uri="{9D8B030D-6E8A-4147-A177-3AD203B41FA5}">
+                      <a16:colId xmlns:a16="http://schemas.microsoft.com/office/drawing/2014/main" val="903649154"/>
+                    </a:ext>
+                  </a:extLst>
+                </a:gridCol>
+              </a:tblGrid>
+              <a:tr h="259759">
+                <a:tc gridSpan="4">
+                  <a:txBody>
+                    <a:bodyPr/>
+                    <a:lstStyle/>
+                    <a:p>
+                      <a:pPr algn="ctr" hangingPunct="0">
+                        <a:lnSpc>
+                          <a:spcPct val="107000"/>
+                        </a:lnSpc>
+                        <a:spcAft>
+                          <a:spcPts val="0"/>
+                        </a:spcAft>
+                      </a:pPr>
+                      <a:r>
+                        <a:rPr lang="fr-FR" sz="1100">
+                          <a:effectLst/>
+                        </a:rPr>
+                        <a:t>ISO VG 32</a:t>
+                      </a:r>
+                      <a:endParaRPr lang="en-US" sz="1100">
+                        <a:effectLst/>
+                        <a:latin typeface="Calibri" panose="020F0502020204030204" pitchFamily="34" charset="0"/>
+                        <a:ea typeface="Times New Roman" panose="02020603050405020304" pitchFamily="18" charset="0"/>
+                        <a:cs typeface="Times New Roman" panose="02020603050405020304" pitchFamily="18" charset="0"/>
+                      </a:endParaRPr>
+                    </a:p>
+                  </a:txBody>
+                  <a:tcPr marL="44450" marR="44450" marT="0" marB="0" anchor="ctr"/>
+                </a:tc>
+                <a:tc hMerge="1">
+                  <a:txBody>
+                    <a:bodyPr/>
+                    <a:lstStyle/>
+                    <a:p>
+                      <a:endParaRPr lang="en-US"/>
+                    </a:p>
+                  </a:txBody>
+                  <a:tcPr/>
+                </a:tc>
+                <a:tc hMerge="1">
+                  <a:txBody>
+                    <a:bodyPr/>
+                    <a:lstStyle/>
+                    <a:p>
+                      <a:endParaRPr lang="en-US"/>
+                    </a:p>
+                  </a:txBody>
+                  <a:tcPr/>
+                </a:tc>
+                <a:tc hMerge="1">
+                  <a:txBody>
+                    <a:bodyPr/>
+                    <a:lstStyle/>
+                    <a:p>
+                      <a:endParaRPr lang="en-US"/>
+                    </a:p>
+                  </a:txBody>
+                  <a:tcPr/>
+                </a:tc>
+                <a:extLst>
+                  <a:ext uri="{0D108BD9-81ED-4DB2-BD59-A6C34878D82A}">
+                    <a16:rowId xmlns:a16="http://schemas.microsoft.com/office/drawing/2014/main" val="951310013"/>
+                  </a:ext>
+                </a:extLst>
+              </a:tr>
+              <a:tr h="487481">
+                <a:tc>
+                  <a:txBody>
+                    <a:bodyPr/>
+                    <a:lstStyle/>
+                    <a:p>
+                      <a:pPr algn="ctr" hangingPunct="0">
+                        <a:lnSpc>
+                          <a:spcPct val="107000"/>
+                        </a:lnSpc>
+                        <a:spcAft>
+                          <a:spcPts val="0"/>
+                        </a:spcAft>
+                      </a:pPr>
+                      <a:r>
+                        <a:rPr lang="fr-FR" sz="1100">
+                          <a:effectLst/>
+                        </a:rPr>
+                        <a:t>Température [°C]</a:t>
+                      </a:r>
+                      <a:endParaRPr lang="en-US" sz="1100">
+                        <a:effectLst/>
+                        <a:latin typeface="Calibri" panose="020F0502020204030204" pitchFamily="34" charset="0"/>
+                        <a:ea typeface="Times New Roman" panose="02020603050405020304" pitchFamily="18" charset="0"/>
+                        <a:cs typeface="Times New Roman" panose="02020603050405020304" pitchFamily="18" charset="0"/>
+                      </a:endParaRPr>
+                    </a:p>
+                  </a:txBody>
+                  <a:tcPr marL="44450" marR="44450" marT="0" marB="0" anchor="ctr"/>
+                </a:tc>
+                <a:tc>
+                  <a:txBody>
+                    <a:bodyPr/>
+                    <a:lstStyle/>
+                    <a:p>
+                      <a:pPr algn="ctr" hangingPunct="0">
+                        <a:lnSpc>
+                          <a:spcPct val="107000"/>
+                        </a:lnSpc>
+                        <a:spcAft>
+                          <a:spcPts val="0"/>
+                        </a:spcAft>
+                      </a:pPr>
+                      <a:r>
+                        <a:rPr lang="fr-FR" sz="1100">
+                          <a:effectLst/>
+                        </a:rPr>
+                        <a:t>Viscosité dynamique [Pa.s]</a:t>
+                      </a:r>
+                      <a:endParaRPr lang="en-US" sz="1100">
+                        <a:effectLst/>
+                      </a:endParaRPr>
+                    </a:p>
+                    <a:p>
+                      <a:pPr algn="ctr" hangingPunct="0">
+                        <a:lnSpc>
+                          <a:spcPct val="107000"/>
+                        </a:lnSpc>
+                        <a:spcAft>
+                          <a:spcPts val="0"/>
+                        </a:spcAft>
+                      </a:pPr>
+                      <a:r>
+                        <a:rPr lang="fr-FR" sz="1100">
+                          <a:effectLst/>
+                        </a:rPr>
+                        <a:t>(mesure)</a:t>
+                      </a:r>
+                      <a:endParaRPr lang="en-US" sz="1100">
+                        <a:effectLst/>
+                        <a:latin typeface="Calibri" panose="020F0502020204030204" pitchFamily="34" charset="0"/>
+                        <a:ea typeface="Times New Roman" panose="02020603050405020304" pitchFamily="18" charset="0"/>
+                        <a:cs typeface="Times New Roman" panose="02020603050405020304" pitchFamily="18" charset="0"/>
+                      </a:endParaRPr>
+                    </a:p>
+                  </a:txBody>
+                  <a:tcPr marL="44450" marR="44450" marT="0" marB="0" anchor="ctr"/>
+                </a:tc>
+                <a:tc>
+                  <a:txBody>
+                    <a:bodyPr/>
+                    <a:lstStyle/>
+                    <a:p>
+                      <a:pPr algn="ctr" hangingPunct="0">
+                        <a:lnSpc>
+                          <a:spcPct val="107000"/>
+                        </a:lnSpc>
+                        <a:spcAft>
+                          <a:spcPts val="0"/>
+                        </a:spcAft>
+                      </a:pPr>
+                      <a:r>
+                        <a:rPr lang="fr-FR" sz="1100">
+                          <a:effectLst/>
+                        </a:rPr>
+                        <a:t>Densité [kg/m3]</a:t>
+                      </a:r>
+                      <a:endParaRPr lang="en-US" sz="1100">
+                        <a:effectLst/>
+                      </a:endParaRPr>
+                    </a:p>
+                    <a:p>
+                      <a:pPr algn="ctr" hangingPunct="0">
+                        <a:lnSpc>
+                          <a:spcPct val="107000"/>
+                        </a:lnSpc>
+                        <a:spcAft>
+                          <a:spcPts val="0"/>
+                        </a:spcAft>
+                      </a:pPr>
+                      <a:r>
+                        <a:rPr lang="fr-FR" sz="1100">
+                          <a:effectLst/>
+                        </a:rPr>
+                        <a:t>(mesure)</a:t>
+                      </a:r>
+                      <a:endParaRPr lang="en-US" sz="1100">
+                        <a:effectLst/>
+                        <a:latin typeface="Calibri" panose="020F0502020204030204" pitchFamily="34" charset="0"/>
+                        <a:ea typeface="Times New Roman" panose="02020603050405020304" pitchFamily="18" charset="0"/>
+                        <a:cs typeface="Times New Roman" panose="02020603050405020304" pitchFamily="18" charset="0"/>
+                      </a:endParaRPr>
+                    </a:p>
+                  </a:txBody>
+                  <a:tcPr marL="44450" marR="44450" marT="0" marB="0" anchor="ctr"/>
+                </a:tc>
+                <a:tc>
+                  <a:txBody>
+                    <a:bodyPr/>
+                    <a:lstStyle/>
+                    <a:p>
+                      <a:pPr algn="ctr" hangingPunct="0">
+                        <a:lnSpc>
+                          <a:spcPct val="107000"/>
+                        </a:lnSpc>
+                        <a:spcAft>
+                          <a:spcPts val="0"/>
+                        </a:spcAft>
+                      </a:pPr>
+                      <a:r>
+                        <a:rPr lang="fr-FR" sz="1100">
+                          <a:effectLst/>
+                        </a:rPr>
+                        <a:t>Viscosité cinématique [cSt]</a:t>
+                      </a:r>
+                      <a:endParaRPr lang="en-US" sz="1100">
+                        <a:effectLst/>
+                      </a:endParaRPr>
+                    </a:p>
+                    <a:p>
+                      <a:pPr algn="ctr" hangingPunct="0">
+                        <a:lnSpc>
+                          <a:spcPct val="107000"/>
+                        </a:lnSpc>
+                        <a:spcAft>
+                          <a:spcPts val="0"/>
+                        </a:spcAft>
+                      </a:pPr>
+                      <a:r>
+                        <a:rPr lang="fr-FR" sz="1100">
+                          <a:effectLst/>
+                        </a:rPr>
+                        <a:t>(calculée)</a:t>
+                      </a:r>
+                      <a:endParaRPr lang="en-US" sz="1100">
+                        <a:effectLst/>
+                        <a:latin typeface="Calibri" panose="020F0502020204030204" pitchFamily="34" charset="0"/>
+                        <a:ea typeface="Times New Roman" panose="02020603050405020304" pitchFamily="18" charset="0"/>
+                        <a:cs typeface="Times New Roman" panose="02020603050405020304" pitchFamily="18" charset="0"/>
+                      </a:endParaRPr>
+                    </a:p>
+                  </a:txBody>
+                  <a:tcPr marL="44450" marR="44450" marT="0" marB="0" anchor="ctr"/>
+                </a:tc>
+                <a:extLst>
+                  <a:ext uri="{0D108BD9-81ED-4DB2-BD59-A6C34878D82A}">
+                    <a16:rowId xmlns:a16="http://schemas.microsoft.com/office/drawing/2014/main" val="982003670"/>
+                  </a:ext>
+                </a:extLst>
+              </a:tr>
+              <a:tr h="161735">
+                <a:tc>
+                  <a:txBody>
+                    <a:bodyPr/>
+                    <a:lstStyle/>
+                    <a:p>
+                      <a:pPr algn="ctr" hangingPunct="0">
+                        <a:lnSpc>
+                          <a:spcPct val="107000"/>
+                        </a:lnSpc>
+                        <a:spcAft>
+                          <a:spcPts val="0"/>
+                        </a:spcAft>
+                      </a:pPr>
+                      <a:r>
+                        <a:rPr lang="fr-FR" sz="1100">
+                          <a:effectLst/>
+                        </a:rPr>
+                        <a:t>20</a:t>
+                      </a:r>
+                      <a:endParaRPr lang="en-US" sz="1100">
+                        <a:effectLst/>
+                        <a:latin typeface="Calibri" panose="020F0502020204030204" pitchFamily="34" charset="0"/>
+                        <a:ea typeface="Times New Roman" panose="02020603050405020304" pitchFamily="18" charset="0"/>
+                        <a:cs typeface="Times New Roman" panose="02020603050405020304" pitchFamily="18" charset="0"/>
+                      </a:endParaRPr>
+                    </a:p>
+                  </a:txBody>
+                  <a:tcPr marL="44450" marR="44450" marT="0" marB="0" anchor="ctr"/>
+                </a:tc>
+                <a:tc>
+                  <a:txBody>
+                    <a:bodyPr/>
+                    <a:lstStyle/>
+                    <a:p>
+                      <a:pPr algn="ctr" hangingPunct="0">
+                        <a:lnSpc>
+                          <a:spcPct val="107000"/>
+                        </a:lnSpc>
+                        <a:spcAft>
+                          <a:spcPts val="0"/>
+                        </a:spcAft>
+                      </a:pPr>
+                      <a:r>
+                        <a:rPr lang="fr-FR" sz="1100">
+                          <a:effectLst/>
+                        </a:rPr>
+                        <a:t>0.0708</a:t>
+                      </a:r>
+                      <a:endParaRPr lang="en-US" sz="1100">
+                        <a:effectLst/>
+                        <a:latin typeface="Calibri" panose="020F0502020204030204" pitchFamily="34" charset="0"/>
+                        <a:ea typeface="Times New Roman" panose="02020603050405020304" pitchFamily="18" charset="0"/>
+                        <a:cs typeface="Times New Roman" panose="02020603050405020304" pitchFamily="18" charset="0"/>
+                      </a:endParaRPr>
+                    </a:p>
+                  </a:txBody>
+                  <a:tcPr marL="44450" marR="44450" marT="0" marB="0" anchor="ctr"/>
+                </a:tc>
+                <a:tc>
+                  <a:txBody>
+                    <a:bodyPr/>
+                    <a:lstStyle/>
+                    <a:p>
+                      <a:pPr algn="ctr" hangingPunct="0">
+                        <a:lnSpc>
+                          <a:spcPct val="107000"/>
+                        </a:lnSpc>
+                        <a:spcAft>
+                          <a:spcPts val="0"/>
+                        </a:spcAft>
+                      </a:pPr>
+                      <a:r>
+                        <a:rPr lang="fr-FR" sz="1100">
+                          <a:effectLst/>
+                        </a:rPr>
+                        <a:t>875.21</a:t>
+                      </a:r>
+                      <a:endParaRPr lang="en-US" sz="1100">
+                        <a:effectLst/>
+                        <a:latin typeface="Calibri" panose="020F0502020204030204" pitchFamily="34" charset="0"/>
+                        <a:ea typeface="Times New Roman" panose="02020603050405020304" pitchFamily="18" charset="0"/>
+                        <a:cs typeface="Times New Roman" panose="02020603050405020304" pitchFamily="18" charset="0"/>
+                      </a:endParaRPr>
+                    </a:p>
+                  </a:txBody>
+                  <a:tcPr marL="44450" marR="44450" marT="0" marB="0" anchor="ctr"/>
+                </a:tc>
+                <a:tc>
+                  <a:txBody>
+                    <a:bodyPr/>
+                    <a:lstStyle/>
+                    <a:p>
+                      <a:pPr algn="ctr" hangingPunct="0">
+                        <a:lnSpc>
+                          <a:spcPct val="107000"/>
+                        </a:lnSpc>
+                        <a:spcAft>
+                          <a:spcPts val="0"/>
+                        </a:spcAft>
+                      </a:pPr>
+                      <a:r>
+                        <a:rPr lang="fr-FR" sz="1100">
+                          <a:effectLst/>
+                        </a:rPr>
+                        <a:t>80.92</a:t>
+                      </a:r>
+                      <a:endParaRPr lang="en-US" sz="1100">
+                        <a:effectLst/>
+                        <a:latin typeface="Calibri" panose="020F0502020204030204" pitchFamily="34" charset="0"/>
+                        <a:ea typeface="Times New Roman" panose="02020603050405020304" pitchFamily="18" charset="0"/>
+                        <a:cs typeface="Times New Roman" panose="02020603050405020304" pitchFamily="18" charset="0"/>
+                      </a:endParaRPr>
+                    </a:p>
+                  </a:txBody>
+                  <a:tcPr marL="44450" marR="44450" marT="0" marB="0" anchor="ctr"/>
+                </a:tc>
+                <a:extLst>
+                  <a:ext uri="{0D108BD9-81ED-4DB2-BD59-A6C34878D82A}">
+                    <a16:rowId xmlns:a16="http://schemas.microsoft.com/office/drawing/2014/main" val="3751377893"/>
+                  </a:ext>
+                </a:extLst>
+              </a:tr>
+              <a:tr h="161735">
+                <a:tc>
+                  <a:txBody>
+                    <a:bodyPr/>
+                    <a:lstStyle/>
+                    <a:p>
+                      <a:pPr algn="ctr" hangingPunct="0">
+                        <a:lnSpc>
+                          <a:spcPct val="107000"/>
+                        </a:lnSpc>
+                        <a:spcAft>
+                          <a:spcPts val="0"/>
+                        </a:spcAft>
+                      </a:pPr>
+                      <a:r>
+                        <a:rPr lang="fr-FR" sz="1100">
+                          <a:effectLst/>
+                        </a:rPr>
+                        <a:t>30</a:t>
+                      </a:r>
+                      <a:endParaRPr lang="en-US" sz="1100">
+                        <a:effectLst/>
+                        <a:latin typeface="Calibri" panose="020F0502020204030204" pitchFamily="34" charset="0"/>
+                        <a:ea typeface="Times New Roman" panose="02020603050405020304" pitchFamily="18" charset="0"/>
+                        <a:cs typeface="Times New Roman" panose="02020603050405020304" pitchFamily="18" charset="0"/>
+                      </a:endParaRPr>
+                    </a:p>
+                  </a:txBody>
+                  <a:tcPr marL="44450" marR="44450" marT="0" marB="0" anchor="ctr"/>
+                </a:tc>
+                <a:tc>
+                  <a:txBody>
+                    <a:bodyPr/>
+                    <a:lstStyle/>
+                    <a:p>
+                      <a:pPr algn="ctr" hangingPunct="0">
+                        <a:lnSpc>
+                          <a:spcPct val="107000"/>
+                        </a:lnSpc>
+                        <a:spcAft>
+                          <a:spcPts val="0"/>
+                        </a:spcAft>
+                      </a:pPr>
+                      <a:r>
+                        <a:rPr lang="fr-FR" sz="1100">
+                          <a:effectLst/>
+                        </a:rPr>
+                        <a:t>0.0406</a:t>
+                      </a:r>
+                      <a:endParaRPr lang="en-US" sz="1100">
+                        <a:effectLst/>
+                        <a:latin typeface="Calibri" panose="020F0502020204030204" pitchFamily="34" charset="0"/>
+                        <a:ea typeface="Times New Roman" panose="02020603050405020304" pitchFamily="18" charset="0"/>
+                        <a:cs typeface="Times New Roman" panose="02020603050405020304" pitchFamily="18" charset="0"/>
+                      </a:endParaRPr>
+                    </a:p>
+                  </a:txBody>
+                  <a:tcPr marL="44450" marR="44450" marT="0" marB="0" anchor="ctr"/>
+                </a:tc>
+                <a:tc>
+                  <a:txBody>
+                    <a:bodyPr/>
+                    <a:lstStyle/>
+                    <a:p>
+                      <a:pPr algn="ctr" hangingPunct="0">
+                        <a:lnSpc>
+                          <a:spcPct val="107000"/>
+                        </a:lnSpc>
+                        <a:spcAft>
+                          <a:spcPts val="0"/>
+                        </a:spcAft>
+                      </a:pPr>
+                      <a:r>
+                        <a:rPr lang="fr-FR" sz="1100">
+                          <a:effectLst/>
+                        </a:rPr>
+                        <a:t>868.87</a:t>
+                      </a:r>
+                      <a:endParaRPr lang="en-US" sz="1100">
+                        <a:effectLst/>
+                        <a:latin typeface="Calibri" panose="020F0502020204030204" pitchFamily="34" charset="0"/>
+                        <a:ea typeface="Times New Roman" panose="02020603050405020304" pitchFamily="18" charset="0"/>
+                        <a:cs typeface="Times New Roman" panose="02020603050405020304" pitchFamily="18" charset="0"/>
+                      </a:endParaRPr>
+                    </a:p>
+                  </a:txBody>
+                  <a:tcPr marL="44450" marR="44450" marT="0" marB="0" anchor="ctr"/>
+                </a:tc>
+                <a:tc>
+                  <a:txBody>
+                    <a:bodyPr/>
+                    <a:lstStyle/>
+                    <a:p>
+                      <a:pPr algn="ctr" hangingPunct="0">
+                        <a:lnSpc>
+                          <a:spcPct val="107000"/>
+                        </a:lnSpc>
+                        <a:spcAft>
+                          <a:spcPts val="0"/>
+                        </a:spcAft>
+                      </a:pPr>
+                      <a:r>
+                        <a:rPr lang="fr-FR" sz="1100">
+                          <a:effectLst/>
+                        </a:rPr>
+                        <a:t>46.69</a:t>
+                      </a:r>
+                      <a:endParaRPr lang="en-US" sz="1100">
+                        <a:effectLst/>
+                        <a:latin typeface="Calibri" panose="020F0502020204030204" pitchFamily="34" charset="0"/>
+                        <a:ea typeface="Times New Roman" panose="02020603050405020304" pitchFamily="18" charset="0"/>
+                        <a:cs typeface="Times New Roman" panose="02020603050405020304" pitchFamily="18" charset="0"/>
+                      </a:endParaRPr>
+                    </a:p>
+                  </a:txBody>
+                  <a:tcPr marL="44450" marR="44450" marT="0" marB="0" anchor="ctr"/>
+                </a:tc>
+                <a:extLst>
+                  <a:ext uri="{0D108BD9-81ED-4DB2-BD59-A6C34878D82A}">
+                    <a16:rowId xmlns:a16="http://schemas.microsoft.com/office/drawing/2014/main" val="384714434"/>
+                  </a:ext>
+                </a:extLst>
+              </a:tr>
+              <a:tr h="161735">
+                <a:tc>
+                  <a:txBody>
+                    <a:bodyPr/>
+                    <a:lstStyle/>
+                    <a:p>
+                      <a:pPr algn="ctr" hangingPunct="0">
+                        <a:lnSpc>
+                          <a:spcPct val="107000"/>
+                        </a:lnSpc>
+                        <a:spcAft>
+                          <a:spcPts val="0"/>
+                        </a:spcAft>
+                      </a:pPr>
+                      <a:r>
+                        <a:rPr lang="fr-FR" sz="1100">
+                          <a:effectLst/>
+                        </a:rPr>
+                        <a:t>40</a:t>
+                      </a:r>
+                      <a:endParaRPr lang="en-US" sz="1100">
+                        <a:effectLst/>
+                        <a:latin typeface="Calibri" panose="020F0502020204030204" pitchFamily="34" charset="0"/>
+                        <a:ea typeface="Times New Roman" panose="02020603050405020304" pitchFamily="18" charset="0"/>
+                        <a:cs typeface="Times New Roman" panose="02020603050405020304" pitchFamily="18" charset="0"/>
+                      </a:endParaRPr>
+                    </a:p>
+                  </a:txBody>
+                  <a:tcPr marL="44450" marR="44450" marT="0" marB="0" anchor="ctr"/>
+                </a:tc>
+                <a:tc>
+                  <a:txBody>
+                    <a:bodyPr/>
+                    <a:lstStyle/>
+                    <a:p>
+                      <a:pPr algn="ctr" hangingPunct="0">
+                        <a:lnSpc>
+                          <a:spcPct val="107000"/>
+                        </a:lnSpc>
+                        <a:spcAft>
+                          <a:spcPts val="0"/>
+                        </a:spcAft>
+                      </a:pPr>
+                      <a:r>
+                        <a:rPr lang="fr-FR" sz="1100">
+                          <a:effectLst/>
+                        </a:rPr>
+                        <a:t>0.0251</a:t>
+                      </a:r>
+                      <a:endParaRPr lang="en-US" sz="1100">
+                        <a:effectLst/>
+                        <a:latin typeface="Calibri" panose="020F0502020204030204" pitchFamily="34" charset="0"/>
+                        <a:ea typeface="Times New Roman" panose="02020603050405020304" pitchFamily="18" charset="0"/>
+                        <a:cs typeface="Times New Roman" panose="02020603050405020304" pitchFamily="18" charset="0"/>
+                      </a:endParaRPr>
+                    </a:p>
+                  </a:txBody>
+                  <a:tcPr marL="44450" marR="44450" marT="0" marB="0" anchor="ctr"/>
+                </a:tc>
+                <a:tc>
+                  <a:txBody>
+                    <a:bodyPr/>
+                    <a:lstStyle/>
+                    <a:p>
+                      <a:pPr algn="ctr" hangingPunct="0">
+                        <a:lnSpc>
+                          <a:spcPct val="107000"/>
+                        </a:lnSpc>
+                        <a:spcAft>
+                          <a:spcPts val="0"/>
+                        </a:spcAft>
+                      </a:pPr>
+                      <a:r>
+                        <a:rPr lang="fr-FR" sz="1100">
+                          <a:effectLst/>
+                        </a:rPr>
+                        <a:t>862.59</a:t>
+                      </a:r>
+                      <a:endParaRPr lang="en-US" sz="1100">
+                        <a:effectLst/>
+                        <a:latin typeface="Calibri" panose="020F0502020204030204" pitchFamily="34" charset="0"/>
+                        <a:ea typeface="Times New Roman" panose="02020603050405020304" pitchFamily="18" charset="0"/>
+                        <a:cs typeface="Times New Roman" panose="02020603050405020304" pitchFamily="18" charset="0"/>
+                      </a:endParaRPr>
+                    </a:p>
+                  </a:txBody>
+                  <a:tcPr marL="44450" marR="44450" marT="0" marB="0" anchor="ctr"/>
+                </a:tc>
+                <a:tc>
+                  <a:txBody>
+                    <a:bodyPr/>
+                    <a:lstStyle/>
+                    <a:p>
+                      <a:pPr algn="ctr" hangingPunct="0">
+                        <a:lnSpc>
+                          <a:spcPct val="107000"/>
+                        </a:lnSpc>
+                        <a:spcAft>
+                          <a:spcPts val="0"/>
+                        </a:spcAft>
+                      </a:pPr>
+                      <a:r>
+                        <a:rPr lang="fr-FR" sz="1100">
+                          <a:effectLst/>
+                        </a:rPr>
+                        <a:t>29.13</a:t>
+                      </a:r>
+                      <a:endParaRPr lang="en-US" sz="1100">
+                        <a:effectLst/>
+                        <a:latin typeface="Calibri" panose="020F0502020204030204" pitchFamily="34" charset="0"/>
+                        <a:ea typeface="Times New Roman" panose="02020603050405020304" pitchFamily="18" charset="0"/>
+                        <a:cs typeface="Times New Roman" panose="02020603050405020304" pitchFamily="18" charset="0"/>
+                      </a:endParaRPr>
+                    </a:p>
+                  </a:txBody>
+                  <a:tcPr marL="44450" marR="44450" marT="0" marB="0" anchor="ctr"/>
+                </a:tc>
+                <a:extLst>
+                  <a:ext uri="{0D108BD9-81ED-4DB2-BD59-A6C34878D82A}">
+                    <a16:rowId xmlns:a16="http://schemas.microsoft.com/office/drawing/2014/main" val="1760563578"/>
+                  </a:ext>
+                </a:extLst>
+              </a:tr>
+              <a:tr h="161735">
+                <a:tc>
+                  <a:txBody>
+                    <a:bodyPr/>
+                    <a:lstStyle/>
+                    <a:p>
+                      <a:pPr algn="ctr" hangingPunct="0">
+                        <a:lnSpc>
+                          <a:spcPct val="107000"/>
+                        </a:lnSpc>
+                        <a:spcAft>
+                          <a:spcPts val="0"/>
+                        </a:spcAft>
+                      </a:pPr>
+                      <a:r>
+                        <a:rPr lang="fr-FR" sz="1100">
+                          <a:effectLst/>
+                        </a:rPr>
+                        <a:t>45</a:t>
+                      </a:r>
+                      <a:endParaRPr lang="en-US" sz="1100">
+                        <a:effectLst/>
+                        <a:latin typeface="Calibri" panose="020F0502020204030204" pitchFamily="34" charset="0"/>
+                        <a:ea typeface="Times New Roman" panose="02020603050405020304" pitchFamily="18" charset="0"/>
+                        <a:cs typeface="Times New Roman" panose="02020603050405020304" pitchFamily="18" charset="0"/>
+                      </a:endParaRPr>
+                    </a:p>
+                  </a:txBody>
+                  <a:tcPr marL="44450" marR="44450" marT="0" marB="0" anchor="ctr"/>
+                </a:tc>
+                <a:tc>
+                  <a:txBody>
+                    <a:bodyPr/>
+                    <a:lstStyle/>
+                    <a:p>
+                      <a:pPr algn="ctr" hangingPunct="0">
+                        <a:lnSpc>
+                          <a:spcPct val="107000"/>
+                        </a:lnSpc>
+                        <a:spcAft>
+                          <a:spcPts val="0"/>
+                        </a:spcAft>
+                      </a:pPr>
+                      <a:r>
+                        <a:rPr lang="fr-FR" sz="1100">
+                          <a:effectLst/>
+                        </a:rPr>
+                        <a:t>0.0202</a:t>
+                      </a:r>
+                      <a:endParaRPr lang="en-US" sz="1100">
+                        <a:effectLst/>
+                        <a:latin typeface="Calibri" panose="020F0502020204030204" pitchFamily="34" charset="0"/>
+                        <a:ea typeface="Times New Roman" panose="02020603050405020304" pitchFamily="18" charset="0"/>
+                        <a:cs typeface="Times New Roman" panose="02020603050405020304" pitchFamily="18" charset="0"/>
+                      </a:endParaRPr>
+                    </a:p>
+                  </a:txBody>
+                  <a:tcPr marL="44450" marR="44450" marT="0" marB="0" anchor="ctr"/>
+                </a:tc>
+                <a:tc>
+                  <a:txBody>
+                    <a:bodyPr/>
+                    <a:lstStyle/>
+                    <a:p>
+                      <a:pPr algn="ctr" hangingPunct="0">
+                        <a:lnSpc>
+                          <a:spcPct val="107000"/>
+                        </a:lnSpc>
+                        <a:spcAft>
+                          <a:spcPts val="0"/>
+                        </a:spcAft>
+                      </a:pPr>
+                      <a:r>
+                        <a:rPr lang="fr-FR" sz="1100">
+                          <a:effectLst/>
+                        </a:rPr>
+                        <a:t>859.34</a:t>
+                      </a:r>
+                      <a:endParaRPr lang="en-US" sz="1100">
+                        <a:effectLst/>
+                        <a:latin typeface="Calibri" panose="020F0502020204030204" pitchFamily="34" charset="0"/>
+                        <a:ea typeface="Times New Roman" panose="02020603050405020304" pitchFamily="18" charset="0"/>
+                        <a:cs typeface="Times New Roman" panose="02020603050405020304" pitchFamily="18" charset="0"/>
+                      </a:endParaRPr>
+                    </a:p>
+                  </a:txBody>
+                  <a:tcPr marL="44450" marR="44450" marT="0" marB="0" anchor="ctr"/>
+                </a:tc>
+                <a:tc>
+                  <a:txBody>
+                    <a:bodyPr/>
+                    <a:lstStyle/>
+                    <a:p>
+                      <a:pPr algn="ctr" hangingPunct="0">
+                        <a:lnSpc>
+                          <a:spcPct val="107000"/>
+                        </a:lnSpc>
+                        <a:spcAft>
+                          <a:spcPts val="0"/>
+                        </a:spcAft>
+                      </a:pPr>
+                      <a:r>
+                        <a:rPr lang="fr-FR" sz="1100">
+                          <a:effectLst/>
+                        </a:rPr>
+                        <a:t>23.55</a:t>
+                      </a:r>
+                      <a:endParaRPr lang="en-US" sz="1100">
+                        <a:effectLst/>
+                        <a:latin typeface="Calibri" panose="020F0502020204030204" pitchFamily="34" charset="0"/>
+                        <a:ea typeface="Times New Roman" panose="02020603050405020304" pitchFamily="18" charset="0"/>
+                        <a:cs typeface="Times New Roman" panose="02020603050405020304" pitchFamily="18" charset="0"/>
+                      </a:endParaRPr>
+                    </a:p>
+                  </a:txBody>
+                  <a:tcPr marL="44450" marR="44450" marT="0" marB="0" anchor="ctr"/>
+                </a:tc>
+                <a:extLst>
+                  <a:ext uri="{0D108BD9-81ED-4DB2-BD59-A6C34878D82A}">
+                    <a16:rowId xmlns:a16="http://schemas.microsoft.com/office/drawing/2014/main" val="156361622"/>
+                  </a:ext>
+                </a:extLst>
+              </a:tr>
+              <a:tr h="161735">
+                <a:tc>
+                  <a:txBody>
+                    <a:bodyPr/>
+                    <a:lstStyle/>
+                    <a:p>
+                      <a:pPr algn="ctr" hangingPunct="0">
+                        <a:lnSpc>
+                          <a:spcPct val="107000"/>
+                        </a:lnSpc>
+                        <a:spcAft>
+                          <a:spcPts val="0"/>
+                        </a:spcAft>
+                      </a:pPr>
+                      <a:r>
+                        <a:rPr lang="fr-FR" sz="1100">
+                          <a:effectLst/>
+                        </a:rPr>
+                        <a:t>50</a:t>
+                      </a:r>
+                      <a:endParaRPr lang="en-US" sz="1100">
+                        <a:effectLst/>
+                        <a:latin typeface="Calibri" panose="020F0502020204030204" pitchFamily="34" charset="0"/>
+                        <a:ea typeface="Times New Roman" panose="02020603050405020304" pitchFamily="18" charset="0"/>
+                        <a:cs typeface="Times New Roman" panose="02020603050405020304" pitchFamily="18" charset="0"/>
+                      </a:endParaRPr>
+                    </a:p>
+                  </a:txBody>
+                  <a:tcPr marL="44450" marR="44450" marT="0" marB="0" anchor="ctr"/>
+                </a:tc>
+                <a:tc>
+                  <a:txBody>
+                    <a:bodyPr/>
+                    <a:lstStyle/>
+                    <a:p>
+                      <a:pPr algn="ctr" hangingPunct="0">
+                        <a:lnSpc>
+                          <a:spcPct val="107000"/>
+                        </a:lnSpc>
+                        <a:spcAft>
+                          <a:spcPts val="0"/>
+                        </a:spcAft>
+                      </a:pPr>
+                      <a:r>
+                        <a:rPr lang="fr-FR" sz="1100">
+                          <a:effectLst/>
+                        </a:rPr>
+                        <a:t>0.0166</a:t>
+                      </a:r>
+                      <a:endParaRPr lang="en-US" sz="1100">
+                        <a:effectLst/>
+                        <a:latin typeface="Calibri" panose="020F0502020204030204" pitchFamily="34" charset="0"/>
+                        <a:ea typeface="Times New Roman" panose="02020603050405020304" pitchFamily="18" charset="0"/>
+                        <a:cs typeface="Times New Roman" panose="02020603050405020304" pitchFamily="18" charset="0"/>
+                      </a:endParaRPr>
+                    </a:p>
+                  </a:txBody>
+                  <a:tcPr marL="44450" marR="44450" marT="0" marB="0" anchor="ctr"/>
+                </a:tc>
+                <a:tc>
+                  <a:txBody>
+                    <a:bodyPr/>
+                    <a:lstStyle/>
+                    <a:p>
+                      <a:pPr algn="ctr" hangingPunct="0">
+                        <a:lnSpc>
+                          <a:spcPct val="107000"/>
+                        </a:lnSpc>
+                        <a:spcAft>
+                          <a:spcPts val="0"/>
+                        </a:spcAft>
+                      </a:pPr>
+                      <a:r>
+                        <a:rPr lang="fr-FR" sz="1100">
+                          <a:effectLst/>
+                        </a:rPr>
+                        <a:t>856.18</a:t>
+                      </a:r>
+                      <a:endParaRPr lang="en-US" sz="1100">
+                        <a:effectLst/>
+                        <a:latin typeface="Calibri" panose="020F0502020204030204" pitchFamily="34" charset="0"/>
+                        <a:ea typeface="Times New Roman" panose="02020603050405020304" pitchFamily="18" charset="0"/>
+                        <a:cs typeface="Times New Roman" panose="02020603050405020304" pitchFamily="18" charset="0"/>
+                      </a:endParaRPr>
+                    </a:p>
+                  </a:txBody>
+                  <a:tcPr marL="44450" marR="44450" marT="0" marB="0" anchor="ctr"/>
+                </a:tc>
+                <a:tc>
+                  <a:txBody>
+                    <a:bodyPr/>
+                    <a:lstStyle/>
+                    <a:p>
+                      <a:pPr algn="ctr" hangingPunct="0">
+                        <a:lnSpc>
+                          <a:spcPct val="107000"/>
+                        </a:lnSpc>
+                        <a:spcAft>
+                          <a:spcPts val="0"/>
+                        </a:spcAft>
+                      </a:pPr>
+                      <a:r>
+                        <a:rPr lang="fr-FR" sz="1100">
+                          <a:effectLst/>
+                        </a:rPr>
+                        <a:t>19.34</a:t>
+                      </a:r>
+                      <a:endParaRPr lang="en-US" sz="1100">
+                        <a:effectLst/>
+                        <a:latin typeface="Calibri" panose="020F0502020204030204" pitchFamily="34" charset="0"/>
+                        <a:ea typeface="Times New Roman" panose="02020603050405020304" pitchFamily="18" charset="0"/>
+                        <a:cs typeface="Times New Roman" panose="02020603050405020304" pitchFamily="18" charset="0"/>
+                      </a:endParaRPr>
+                    </a:p>
+                  </a:txBody>
+                  <a:tcPr marL="44450" marR="44450" marT="0" marB="0" anchor="ctr"/>
+                </a:tc>
+                <a:extLst>
+                  <a:ext uri="{0D108BD9-81ED-4DB2-BD59-A6C34878D82A}">
+                    <a16:rowId xmlns:a16="http://schemas.microsoft.com/office/drawing/2014/main" val="808965152"/>
+                  </a:ext>
+                </a:extLst>
+              </a:tr>
+              <a:tr h="161735">
+                <a:tc>
+                  <a:txBody>
+                    <a:bodyPr/>
+                    <a:lstStyle/>
+                    <a:p>
+                      <a:pPr algn="ctr" hangingPunct="0">
+                        <a:lnSpc>
+                          <a:spcPct val="107000"/>
+                        </a:lnSpc>
+                        <a:spcAft>
+                          <a:spcPts val="0"/>
+                        </a:spcAft>
+                      </a:pPr>
+                      <a:r>
+                        <a:rPr lang="fr-FR" sz="1100">
+                          <a:effectLst/>
+                        </a:rPr>
+                        <a:t>55</a:t>
+                      </a:r>
+                      <a:endParaRPr lang="en-US" sz="1100">
+                        <a:effectLst/>
+                        <a:latin typeface="Calibri" panose="020F0502020204030204" pitchFamily="34" charset="0"/>
+                        <a:ea typeface="Times New Roman" panose="02020603050405020304" pitchFamily="18" charset="0"/>
+                        <a:cs typeface="Times New Roman" panose="02020603050405020304" pitchFamily="18" charset="0"/>
+                      </a:endParaRPr>
+                    </a:p>
+                  </a:txBody>
+                  <a:tcPr marL="44450" marR="44450" marT="0" marB="0" anchor="ctr"/>
+                </a:tc>
+                <a:tc>
+                  <a:txBody>
+                    <a:bodyPr/>
+                    <a:lstStyle/>
+                    <a:p>
+                      <a:pPr algn="ctr" hangingPunct="0">
+                        <a:lnSpc>
+                          <a:spcPct val="107000"/>
+                        </a:lnSpc>
+                        <a:spcAft>
+                          <a:spcPts val="0"/>
+                        </a:spcAft>
+                      </a:pPr>
+                      <a:r>
+                        <a:rPr lang="fr-FR" sz="1100">
+                          <a:effectLst/>
+                        </a:rPr>
+                        <a:t>0.0137</a:t>
+                      </a:r>
+                      <a:endParaRPr lang="en-US" sz="1100">
+                        <a:effectLst/>
+                        <a:latin typeface="Calibri" panose="020F0502020204030204" pitchFamily="34" charset="0"/>
+                        <a:ea typeface="Times New Roman" panose="02020603050405020304" pitchFamily="18" charset="0"/>
+                        <a:cs typeface="Times New Roman" panose="02020603050405020304" pitchFamily="18" charset="0"/>
+                      </a:endParaRPr>
+                    </a:p>
+                  </a:txBody>
+                  <a:tcPr marL="44450" marR="44450" marT="0" marB="0" anchor="ctr"/>
+                </a:tc>
+                <a:tc>
+                  <a:txBody>
+                    <a:bodyPr/>
+                    <a:lstStyle/>
+                    <a:p>
+                      <a:pPr algn="ctr" hangingPunct="0">
+                        <a:lnSpc>
+                          <a:spcPct val="107000"/>
+                        </a:lnSpc>
+                        <a:spcAft>
+                          <a:spcPts val="0"/>
+                        </a:spcAft>
+                      </a:pPr>
+                      <a:r>
+                        <a:rPr lang="fr-FR" sz="1100">
+                          <a:effectLst/>
+                        </a:rPr>
+                        <a:t>853.12</a:t>
+                      </a:r>
+                      <a:endParaRPr lang="en-US" sz="1100">
+                        <a:effectLst/>
+                        <a:latin typeface="Calibri" panose="020F0502020204030204" pitchFamily="34" charset="0"/>
+                        <a:ea typeface="Times New Roman" panose="02020603050405020304" pitchFamily="18" charset="0"/>
+                        <a:cs typeface="Times New Roman" panose="02020603050405020304" pitchFamily="18" charset="0"/>
+                      </a:endParaRPr>
+                    </a:p>
+                  </a:txBody>
+                  <a:tcPr marL="44450" marR="44450" marT="0" marB="0" anchor="ctr"/>
+                </a:tc>
+                <a:tc>
+                  <a:txBody>
+                    <a:bodyPr/>
+                    <a:lstStyle/>
+                    <a:p>
+                      <a:pPr algn="ctr" hangingPunct="0">
+                        <a:lnSpc>
+                          <a:spcPct val="107000"/>
+                        </a:lnSpc>
+                        <a:spcAft>
+                          <a:spcPts val="0"/>
+                        </a:spcAft>
+                      </a:pPr>
+                      <a:r>
+                        <a:rPr lang="fr-FR" sz="1100">
+                          <a:effectLst/>
+                        </a:rPr>
+                        <a:t>16.11</a:t>
+                      </a:r>
+                      <a:endParaRPr lang="en-US" sz="1100">
+                        <a:effectLst/>
+                        <a:latin typeface="Calibri" panose="020F0502020204030204" pitchFamily="34" charset="0"/>
+                        <a:ea typeface="Times New Roman" panose="02020603050405020304" pitchFamily="18" charset="0"/>
+                        <a:cs typeface="Times New Roman" panose="02020603050405020304" pitchFamily="18" charset="0"/>
+                      </a:endParaRPr>
+                    </a:p>
+                  </a:txBody>
+                  <a:tcPr marL="44450" marR="44450" marT="0" marB="0" anchor="ctr"/>
+                </a:tc>
+                <a:extLst>
+                  <a:ext uri="{0D108BD9-81ED-4DB2-BD59-A6C34878D82A}">
+                    <a16:rowId xmlns:a16="http://schemas.microsoft.com/office/drawing/2014/main" val="1928205258"/>
+                  </a:ext>
+                </a:extLst>
+              </a:tr>
+              <a:tr h="161735">
+                <a:tc>
+                  <a:txBody>
+                    <a:bodyPr/>
+                    <a:lstStyle/>
+                    <a:p>
+                      <a:pPr algn="ctr" hangingPunct="0">
+                        <a:lnSpc>
+                          <a:spcPct val="107000"/>
+                        </a:lnSpc>
+                        <a:spcAft>
+                          <a:spcPts val="0"/>
+                        </a:spcAft>
+                      </a:pPr>
+                      <a:r>
+                        <a:rPr lang="fr-FR" sz="1100">
+                          <a:effectLst/>
+                        </a:rPr>
+                        <a:t>60</a:t>
+                      </a:r>
+                      <a:endParaRPr lang="en-US" sz="1100">
+                        <a:effectLst/>
+                        <a:latin typeface="Calibri" panose="020F0502020204030204" pitchFamily="34" charset="0"/>
+                        <a:ea typeface="Times New Roman" panose="02020603050405020304" pitchFamily="18" charset="0"/>
+                        <a:cs typeface="Times New Roman" panose="02020603050405020304" pitchFamily="18" charset="0"/>
+                      </a:endParaRPr>
+                    </a:p>
+                  </a:txBody>
+                  <a:tcPr marL="44450" marR="44450" marT="0" marB="0" anchor="ctr"/>
+                </a:tc>
+                <a:tc>
+                  <a:txBody>
+                    <a:bodyPr/>
+                    <a:lstStyle/>
+                    <a:p>
+                      <a:pPr algn="ctr" hangingPunct="0">
+                        <a:lnSpc>
+                          <a:spcPct val="107000"/>
+                        </a:lnSpc>
+                        <a:spcAft>
+                          <a:spcPts val="0"/>
+                        </a:spcAft>
+                      </a:pPr>
+                      <a:r>
+                        <a:rPr lang="fr-FR" sz="1100">
+                          <a:effectLst/>
+                        </a:rPr>
+                        <a:t>0.0115</a:t>
+                      </a:r>
+                      <a:endParaRPr lang="en-US" sz="1100">
+                        <a:effectLst/>
+                        <a:latin typeface="Calibri" panose="020F0502020204030204" pitchFamily="34" charset="0"/>
+                        <a:ea typeface="Times New Roman" panose="02020603050405020304" pitchFamily="18" charset="0"/>
+                        <a:cs typeface="Times New Roman" panose="02020603050405020304" pitchFamily="18" charset="0"/>
+                      </a:endParaRPr>
+                    </a:p>
+                  </a:txBody>
+                  <a:tcPr marL="44450" marR="44450" marT="0" marB="0" anchor="ctr"/>
+                </a:tc>
+                <a:tc>
+                  <a:txBody>
+                    <a:bodyPr/>
+                    <a:lstStyle/>
+                    <a:p>
+                      <a:pPr algn="ctr" hangingPunct="0">
+                        <a:lnSpc>
+                          <a:spcPct val="107000"/>
+                        </a:lnSpc>
+                        <a:spcAft>
+                          <a:spcPts val="0"/>
+                        </a:spcAft>
+                      </a:pPr>
+                      <a:r>
+                        <a:rPr lang="fr-FR" sz="1100">
+                          <a:effectLst/>
+                        </a:rPr>
+                        <a:t>849.68</a:t>
+                      </a:r>
+                      <a:endParaRPr lang="en-US" sz="1100">
+                        <a:effectLst/>
+                        <a:latin typeface="Calibri" panose="020F0502020204030204" pitchFamily="34" charset="0"/>
+                        <a:ea typeface="Times New Roman" panose="02020603050405020304" pitchFamily="18" charset="0"/>
+                        <a:cs typeface="Times New Roman" panose="02020603050405020304" pitchFamily="18" charset="0"/>
+                      </a:endParaRPr>
+                    </a:p>
+                  </a:txBody>
+                  <a:tcPr marL="44450" marR="44450" marT="0" marB="0" anchor="ctr"/>
+                </a:tc>
+                <a:tc>
+                  <a:txBody>
+                    <a:bodyPr/>
+                    <a:lstStyle/>
+                    <a:p>
+                      <a:pPr algn="ctr" hangingPunct="0">
+                        <a:lnSpc>
+                          <a:spcPct val="107000"/>
+                        </a:lnSpc>
+                        <a:spcAft>
+                          <a:spcPts val="0"/>
+                        </a:spcAft>
+                      </a:pPr>
+                      <a:r>
+                        <a:rPr lang="fr-FR" sz="1100">
+                          <a:effectLst/>
+                        </a:rPr>
+                        <a:t>13.57</a:t>
+                      </a:r>
+                      <a:endParaRPr lang="en-US" sz="1100">
+                        <a:effectLst/>
+                        <a:latin typeface="Calibri" panose="020F0502020204030204" pitchFamily="34" charset="0"/>
+                        <a:ea typeface="Times New Roman" panose="02020603050405020304" pitchFamily="18" charset="0"/>
+                        <a:cs typeface="Times New Roman" panose="02020603050405020304" pitchFamily="18" charset="0"/>
+                      </a:endParaRPr>
+                    </a:p>
+                  </a:txBody>
+                  <a:tcPr marL="44450" marR="44450" marT="0" marB="0" anchor="ctr"/>
+                </a:tc>
+                <a:extLst>
+                  <a:ext uri="{0D108BD9-81ED-4DB2-BD59-A6C34878D82A}">
+                    <a16:rowId xmlns:a16="http://schemas.microsoft.com/office/drawing/2014/main" val="426953227"/>
+                  </a:ext>
+                </a:extLst>
+              </a:tr>
+              <a:tr h="161735">
+                <a:tc>
+                  <a:txBody>
+                    <a:bodyPr/>
+                    <a:lstStyle/>
+                    <a:p>
+                      <a:pPr algn="ctr" hangingPunct="0">
+                        <a:lnSpc>
+                          <a:spcPct val="107000"/>
+                        </a:lnSpc>
+                        <a:spcAft>
+                          <a:spcPts val="0"/>
+                        </a:spcAft>
+                      </a:pPr>
+                      <a:r>
+                        <a:rPr lang="fr-FR" sz="1100">
+                          <a:effectLst/>
+                        </a:rPr>
+                        <a:t>65</a:t>
+                      </a:r>
+                      <a:endParaRPr lang="en-US" sz="1100">
+                        <a:effectLst/>
+                        <a:latin typeface="Calibri" panose="020F0502020204030204" pitchFamily="34" charset="0"/>
+                        <a:ea typeface="Times New Roman" panose="02020603050405020304" pitchFamily="18" charset="0"/>
+                        <a:cs typeface="Times New Roman" panose="02020603050405020304" pitchFamily="18" charset="0"/>
+                      </a:endParaRPr>
+                    </a:p>
+                  </a:txBody>
+                  <a:tcPr marL="44450" marR="44450" marT="0" marB="0" anchor="ctr"/>
+                </a:tc>
+                <a:tc>
+                  <a:txBody>
+                    <a:bodyPr/>
+                    <a:lstStyle/>
+                    <a:p>
+                      <a:pPr algn="ctr" hangingPunct="0">
+                        <a:lnSpc>
+                          <a:spcPct val="107000"/>
+                        </a:lnSpc>
+                        <a:spcAft>
+                          <a:spcPts val="0"/>
+                        </a:spcAft>
+                      </a:pPr>
+                      <a:r>
+                        <a:rPr lang="fr-FR" sz="1100">
+                          <a:effectLst/>
+                        </a:rPr>
+                        <a:t>0.0098</a:t>
+                      </a:r>
+                      <a:endParaRPr lang="en-US" sz="1100">
+                        <a:effectLst/>
+                        <a:latin typeface="Calibri" panose="020F0502020204030204" pitchFamily="34" charset="0"/>
+                        <a:ea typeface="Times New Roman" panose="02020603050405020304" pitchFamily="18" charset="0"/>
+                        <a:cs typeface="Times New Roman" panose="02020603050405020304" pitchFamily="18" charset="0"/>
+                      </a:endParaRPr>
+                    </a:p>
+                  </a:txBody>
+                  <a:tcPr marL="44450" marR="44450" marT="0" marB="0" anchor="ctr"/>
+                </a:tc>
+                <a:tc>
+                  <a:txBody>
+                    <a:bodyPr/>
+                    <a:lstStyle/>
+                    <a:p>
+                      <a:pPr algn="ctr" hangingPunct="0">
+                        <a:lnSpc>
+                          <a:spcPct val="107000"/>
+                        </a:lnSpc>
+                        <a:spcAft>
+                          <a:spcPts val="0"/>
+                        </a:spcAft>
+                      </a:pPr>
+                      <a:r>
+                        <a:rPr lang="fr-FR" sz="1100">
+                          <a:effectLst/>
+                        </a:rPr>
+                        <a:t>846.78</a:t>
+                      </a:r>
+                      <a:endParaRPr lang="en-US" sz="1100">
+                        <a:effectLst/>
+                        <a:latin typeface="Calibri" panose="020F0502020204030204" pitchFamily="34" charset="0"/>
+                        <a:ea typeface="Times New Roman" panose="02020603050405020304" pitchFamily="18" charset="0"/>
+                        <a:cs typeface="Times New Roman" panose="02020603050405020304" pitchFamily="18" charset="0"/>
+                      </a:endParaRPr>
+                    </a:p>
+                  </a:txBody>
+                  <a:tcPr marL="44450" marR="44450" marT="0" marB="0" anchor="ctr"/>
+                </a:tc>
+                <a:tc>
+                  <a:txBody>
+                    <a:bodyPr/>
+                    <a:lstStyle/>
+                    <a:p>
+                      <a:pPr algn="ctr" hangingPunct="0">
+                        <a:lnSpc>
+                          <a:spcPct val="107000"/>
+                        </a:lnSpc>
+                        <a:spcAft>
+                          <a:spcPts val="0"/>
+                        </a:spcAft>
+                      </a:pPr>
+                      <a:r>
+                        <a:rPr lang="fr-FR" sz="1100">
+                          <a:effectLst/>
+                        </a:rPr>
+                        <a:t>11.56</a:t>
+                      </a:r>
+                      <a:endParaRPr lang="en-US" sz="1100">
+                        <a:effectLst/>
+                        <a:latin typeface="Calibri" panose="020F0502020204030204" pitchFamily="34" charset="0"/>
+                        <a:ea typeface="Times New Roman" panose="02020603050405020304" pitchFamily="18" charset="0"/>
+                        <a:cs typeface="Times New Roman" panose="02020603050405020304" pitchFamily="18" charset="0"/>
+                      </a:endParaRPr>
+                    </a:p>
+                  </a:txBody>
+                  <a:tcPr marL="44450" marR="44450" marT="0" marB="0" anchor="ctr"/>
+                </a:tc>
+                <a:extLst>
+                  <a:ext uri="{0D108BD9-81ED-4DB2-BD59-A6C34878D82A}">
+                    <a16:rowId xmlns:a16="http://schemas.microsoft.com/office/drawing/2014/main" val="971627774"/>
+                  </a:ext>
+                </a:extLst>
+              </a:tr>
+              <a:tr h="161735">
+                <a:tc>
+                  <a:txBody>
+                    <a:bodyPr/>
+                    <a:lstStyle/>
+                    <a:p>
+                      <a:pPr algn="ctr" hangingPunct="0">
+                        <a:lnSpc>
+                          <a:spcPct val="107000"/>
+                        </a:lnSpc>
+                        <a:spcAft>
+                          <a:spcPts val="0"/>
+                        </a:spcAft>
+                      </a:pPr>
+                      <a:r>
+                        <a:rPr lang="fr-FR" sz="1100">
+                          <a:effectLst/>
+                        </a:rPr>
+                        <a:t>70</a:t>
+                      </a:r>
+                      <a:endParaRPr lang="en-US" sz="1100">
+                        <a:effectLst/>
+                        <a:latin typeface="Calibri" panose="020F0502020204030204" pitchFamily="34" charset="0"/>
+                        <a:ea typeface="Times New Roman" panose="02020603050405020304" pitchFamily="18" charset="0"/>
+                        <a:cs typeface="Times New Roman" panose="02020603050405020304" pitchFamily="18" charset="0"/>
+                      </a:endParaRPr>
+                    </a:p>
+                  </a:txBody>
+                  <a:tcPr marL="44450" marR="44450" marT="0" marB="0" anchor="ctr"/>
+                </a:tc>
+                <a:tc>
+                  <a:txBody>
+                    <a:bodyPr/>
+                    <a:lstStyle/>
+                    <a:p>
+                      <a:pPr algn="ctr" hangingPunct="0">
+                        <a:lnSpc>
+                          <a:spcPct val="107000"/>
+                        </a:lnSpc>
+                        <a:spcAft>
+                          <a:spcPts val="0"/>
+                        </a:spcAft>
+                      </a:pPr>
+                      <a:r>
+                        <a:rPr lang="fr-FR" sz="1100">
+                          <a:effectLst/>
+                        </a:rPr>
+                        <a:t>0.0084</a:t>
+                      </a:r>
+                      <a:endParaRPr lang="en-US" sz="1100">
+                        <a:effectLst/>
+                        <a:latin typeface="Calibri" panose="020F0502020204030204" pitchFamily="34" charset="0"/>
+                        <a:ea typeface="Times New Roman" panose="02020603050405020304" pitchFamily="18" charset="0"/>
+                        <a:cs typeface="Times New Roman" panose="02020603050405020304" pitchFamily="18" charset="0"/>
+                      </a:endParaRPr>
+                    </a:p>
+                  </a:txBody>
+                  <a:tcPr marL="44450" marR="44450" marT="0" marB="0" anchor="ctr"/>
+                </a:tc>
+                <a:tc>
+                  <a:txBody>
+                    <a:bodyPr/>
+                    <a:lstStyle/>
+                    <a:p>
+                      <a:pPr algn="ctr" hangingPunct="0">
+                        <a:lnSpc>
+                          <a:spcPct val="107000"/>
+                        </a:lnSpc>
+                        <a:spcAft>
+                          <a:spcPts val="0"/>
+                        </a:spcAft>
+                      </a:pPr>
+                      <a:r>
+                        <a:rPr lang="fr-FR" sz="1100">
+                          <a:effectLst/>
+                        </a:rPr>
+                        <a:t>843.55</a:t>
+                      </a:r>
+                      <a:endParaRPr lang="en-US" sz="1100">
+                        <a:effectLst/>
+                        <a:latin typeface="Calibri" panose="020F0502020204030204" pitchFamily="34" charset="0"/>
+                        <a:ea typeface="Times New Roman" panose="02020603050405020304" pitchFamily="18" charset="0"/>
+                        <a:cs typeface="Times New Roman" panose="02020603050405020304" pitchFamily="18" charset="0"/>
+                      </a:endParaRPr>
+                    </a:p>
+                  </a:txBody>
+                  <a:tcPr marL="44450" marR="44450" marT="0" marB="0" anchor="ctr"/>
+                </a:tc>
+                <a:tc>
+                  <a:txBody>
+                    <a:bodyPr/>
+                    <a:lstStyle/>
+                    <a:p>
+                      <a:pPr algn="ctr" hangingPunct="0">
+                        <a:lnSpc>
+                          <a:spcPct val="107000"/>
+                        </a:lnSpc>
+                        <a:spcAft>
+                          <a:spcPts val="0"/>
+                        </a:spcAft>
+                      </a:pPr>
+                      <a:r>
+                        <a:rPr lang="fr-FR" sz="1100">
+                          <a:effectLst/>
+                        </a:rPr>
+                        <a:t>9.96</a:t>
+                      </a:r>
+                      <a:endParaRPr lang="en-US" sz="1100">
+                        <a:effectLst/>
+                        <a:latin typeface="Calibri" panose="020F0502020204030204" pitchFamily="34" charset="0"/>
+                        <a:ea typeface="Times New Roman" panose="02020603050405020304" pitchFamily="18" charset="0"/>
+                        <a:cs typeface="Times New Roman" panose="02020603050405020304" pitchFamily="18" charset="0"/>
+                      </a:endParaRPr>
+                    </a:p>
+                  </a:txBody>
+                  <a:tcPr marL="44450" marR="44450" marT="0" marB="0" anchor="ctr"/>
+                </a:tc>
+                <a:extLst>
+                  <a:ext uri="{0D108BD9-81ED-4DB2-BD59-A6C34878D82A}">
+                    <a16:rowId xmlns:a16="http://schemas.microsoft.com/office/drawing/2014/main" val="1743074929"/>
+                  </a:ext>
+                </a:extLst>
+              </a:tr>
+              <a:tr h="161735">
+                <a:tc>
+                  <a:txBody>
+                    <a:bodyPr/>
+                    <a:lstStyle/>
+                    <a:p>
+                      <a:pPr algn="ctr" hangingPunct="0">
+                        <a:lnSpc>
+                          <a:spcPct val="107000"/>
+                        </a:lnSpc>
+                        <a:spcAft>
+                          <a:spcPts val="0"/>
+                        </a:spcAft>
+                      </a:pPr>
+                      <a:r>
+                        <a:rPr lang="fr-FR" sz="1100">
+                          <a:effectLst/>
+                        </a:rPr>
+                        <a:t>75</a:t>
+                      </a:r>
+                      <a:endParaRPr lang="en-US" sz="1100">
+                        <a:effectLst/>
+                        <a:latin typeface="Calibri" panose="020F0502020204030204" pitchFamily="34" charset="0"/>
+                        <a:ea typeface="Times New Roman" panose="02020603050405020304" pitchFamily="18" charset="0"/>
+                        <a:cs typeface="Times New Roman" panose="02020603050405020304" pitchFamily="18" charset="0"/>
+                      </a:endParaRPr>
+                    </a:p>
+                  </a:txBody>
+                  <a:tcPr marL="44450" marR="44450" marT="0" marB="0" anchor="ctr"/>
+                </a:tc>
+                <a:tc>
+                  <a:txBody>
+                    <a:bodyPr/>
+                    <a:lstStyle/>
+                    <a:p>
+                      <a:pPr algn="ctr" hangingPunct="0">
+                        <a:lnSpc>
+                          <a:spcPct val="107000"/>
+                        </a:lnSpc>
+                        <a:spcAft>
+                          <a:spcPts val="0"/>
+                        </a:spcAft>
+                      </a:pPr>
+                      <a:r>
+                        <a:rPr lang="fr-FR" sz="1100">
+                          <a:effectLst/>
+                        </a:rPr>
+                        <a:t>0.0073</a:t>
+                      </a:r>
+                      <a:endParaRPr lang="en-US" sz="1100">
+                        <a:effectLst/>
+                        <a:latin typeface="Calibri" panose="020F0502020204030204" pitchFamily="34" charset="0"/>
+                        <a:ea typeface="Times New Roman" panose="02020603050405020304" pitchFamily="18" charset="0"/>
+                        <a:cs typeface="Times New Roman" panose="02020603050405020304" pitchFamily="18" charset="0"/>
+                      </a:endParaRPr>
+                    </a:p>
+                  </a:txBody>
+                  <a:tcPr marL="44450" marR="44450" marT="0" marB="0" anchor="ctr"/>
+                </a:tc>
+                <a:tc>
+                  <a:txBody>
+                    <a:bodyPr/>
+                    <a:lstStyle/>
+                    <a:p>
+                      <a:pPr algn="ctr" hangingPunct="0">
+                        <a:lnSpc>
+                          <a:spcPct val="107000"/>
+                        </a:lnSpc>
+                        <a:spcAft>
+                          <a:spcPts val="0"/>
+                        </a:spcAft>
+                      </a:pPr>
+                      <a:r>
+                        <a:rPr lang="fr-FR" sz="1100">
+                          <a:effectLst/>
+                        </a:rPr>
+                        <a:t>840.38</a:t>
+                      </a:r>
+                      <a:endParaRPr lang="en-US" sz="1100">
+                        <a:effectLst/>
+                        <a:latin typeface="Calibri" panose="020F0502020204030204" pitchFamily="34" charset="0"/>
+                        <a:ea typeface="Times New Roman" panose="02020603050405020304" pitchFamily="18" charset="0"/>
+                        <a:cs typeface="Times New Roman" panose="02020603050405020304" pitchFamily="18" charset="0"/>
+                      </a:endParaRPr>
+                    </a:p>
+                  </a:txBody>
+                  <a:tcPr marL="44450" marR="44450" marT="0" marB="0" anchor="ctr"/>
+                </a:tc>
+                <a:tc>
+                  <a:txBody>
+                    <a:bodyPr/>
+                    <a:lstStyle/>
+                    <a:p>
+                      <a:pPr algn="ctr" hangingPunct="0">
+                        <a:lnSpc>
+                          <a:spcPct val="107000"/>
+                        </a:lnSpc>
+                        <a:spcAft>
+                          <a:spcPts val="0"/>
+                        </a:spcAft>
+                      </a:pPr>
+                      <a:r>
+                        <a:rPr lang="fr-FR" sz="1100">
+                          <a:effectLst/>
+                        </a:rPr>
+                        <a:t>8.66</a:t>
+                      </a:r>
+                      <a:endParaRPr lang="en-US" sz="1100">
+                        <a:effectLst/>
+                        <a:latin typeface="Calibri" panose="020F0502020204030204" pitchFamily="34" charset="0"/>
+                        <a:ea typeface="Times New Roman" panose="02020603050405020304" pitchFamily="18" charset="0"/>
+                        <a:cs typeface="Times New Roman" panose="02020603050405020304" pitchFamily="18" charset="0"/>
+                      </a:endParaRPr>
+                    </a:p>
+                  </a:txBody>
+                  <a:tcPr marL="44450" marR="44450" marT="0" marB="0" anchor="ctr"/>
+                </a:tc>
+                <a:extLst>
+                  <a:ext uri="{0D108BD9-81ED-4DB2-BD59-A6C34878D82A}">
+                    <a16:rowId xmlns:a16="http://schemas.microsoft.com/office/drawing/2014/main" val="3350686135"/>
+                  </a:ext>
+                </a:extLst>
+              </a:tr>
+              <a:tr h="161735">
+                <a:tc>
+                  <a:txBody>
+                    <a:bodyPr/>
+                    <a:lstStyle/>
+                    <a:p>
+                      <a:pPr algn="ctr" hangingPunct="0">
+                        <a:lnSpc>
+                          <a:spcPct val="107000"/>
+                        </a:lnSpc>
+                        <a:spcAft>
+                          <a:spcPts val="0"/>
+                        </a:spcAft>
+                      </a:pPr>
+                      <a:r>
+                        <a:rPr lang="fr-FR" sz="1100">
+                          <a:effectLst/>
+                        </a:rPr>
+                        <a:t>80</a:t>
+                      </a:r>
+                      <a:endParaRPr lang="en-US" sz="1100">
+                        <a:effectLst/>
+                        <a:latin typeface="Calibri" panose="020F0502020204030204" pitchFamily="34" charset="0"/>
+                        <a:ea typeface="Times New Roman" panose="02020603050405020304" pitchFamily="18" charset="0"/>
+                        <a:cs typeface="Times New Roman" panose="02020603050405020304" pitchFamily="18" charset="0"/>
+                      </a:endParaRPr>
+                    </a:p>
+                  </a:txBody>
+                  <a:tcPr marL="44450" marR="44450" marT="0" marB="0" anchor="ctr"/>
+                </a:tc>
+                <a:tc>
+                  <a:txBody>
+                    <a:bodyPr/>
+                    <a:lstStyle/>
+                    <a:p>
+                      <a:pPr algn="ctr" hangingPunct="0">
+                        <a:lnSpc>
+                          <a:spcPct val="107000"/>
+                        </a:lnSpc>
+                        <a:spcAft>
+                          <a:spcPts val="0"/>
+                        </a:spcAft>
+                      </a:pPr>
+                      <a:r>
+                        <a:rPr lang="fr-FR" sz="1100">
+                          <a:effectLst/>
+                        </a:rPr>
+                        <a:t>0.0064</a:t>
+                      </a:r>
+                      <a:endParaRPr lang="en-US" sz="1100">
+                        <a:effectLst/>
+                        <a:latin typeface="Calibri" panose="020F0502020204030204" pitchFamily="34" charset="0"/>
+                        <a:ea typeface="Times New Roman" panose="02020603050405020304" pitchFamily="18" charset="0"/>
+                        <a:cs typeface="Times New Roman" panose="02020603050405020304" pitchFamily="18" charset="0"/>
+                      </a:endParaRPr>
+                    </a:p>
+                  </a:txBody>
+                  <a:tcPr marL="44450" marR="44450" marT="0" marB="0" anchor="ctr"/>
+                </a:tc>
+                <a:tc>
+                  <a:txBody>
+                    <a:bodyPr/>
+                    <a:lstStyle/>
+                    <a:p>
+                      <a:pPr algn="ctr" hangingPunct="0">
+                        <a:lnSpc>
+                          <a:spcPct val="107000"/>
+                        </a:lnSpc>
+                        <a:spcAft>
+                          <a:spcPts val="0"/>
+                        </a:spcAft>
+                      </a:pPr>
+                      <a:r>
+                        <a:rPr lang="fr-FR" sz="1100">
+                          <a:effectLst/>
+                        </a:rPr>
+                        <a:t>837.20</a:t>
+                      </a:r>
+                      <a:endParaRPr lang="en-US" sz="1100">
+                        <a:effectLst/>
+                        <a:latin typeface="Calibri" panose="020F0502020204030204" pitchFamily="34" charset="0"/>
+                        <a:ea typeface="Times New Roman" panose="02020603050405020304" pitchFamily="18" charset="0"/>
+                        <a:cs typeface="Times New Roman" panose="02020603050405020304" pitchFamily="18" charset="0"/>
+                      </a:endParaRPr>
+                    </a:p>
+                  </a:txBody>
+                  <a:tcPr marL="44450" marR="44450" marT="0" marB="0" anchor="ctr"/>
+                </a:tc>
+                <a:tc>
+                  <a:txBody>
+                    <a:bodyPr/>
+                    <a:lstStyle/>
+                    <a:p>
+                      <a:pPr algn="ctr" hangingPunct="0">
+                        <a:lnSpc>
+                          <a:spcPct val="107000"/>
+                        </a:lnSpc>
+                        <a:spcAft>
+                          <a:spcPts val="0"/>
+                        </a:spcAft>
+                      </a:pPr>
+                      <a:r>
+                        <a:rPr lang="fr-FR" sz="1100" dirty="0">
+                          <a:effectLst/>
+                        </a:rPr>
+                        <a:t>7.58</a:t>
+                      </a:r>
+                      <a:endParaRPr lang="en-US" sz="1100" dirty="0">
+                        <a:effectLst/>
+                        <a:latin typeface="Calibri" panose="020F0502020204030204" pitchFamily="34" charset="0"/>
+                        <a:ea typeface="Times New Roman" panose="02020603050405020304" pitchFamily="18" charset="0"/>
+                        <a:cs typeface="Times New Roman" panose="02020603050405020304" pitchFamily="18" charset="0"/>
+                      </a:endParaRPr>
+                    </a:p>
+                  </a:txBody>
+                  <a:tcPr marL="44450" marR="44450" marT="0" marB="0" anchor="ctr"/>
+                </a:tc>
+                <a:extLst>
+                  <a:ext uri="{0D108BD9-81ED-4DB2-BD59-A6C34878D82A}">
+                    <a16:rowId xmlns:a16="http://schemas.microsoft.com/office/drawing/2014/main" val="2390881144"/>
+                  </a:ext>
+                </a:extLst>
+              </a:tr>
+            </a:tbl>
+          </a:graphicData>
+        </a:graphic>
+      </p:graphicFrame>
+    </p:spTree>
+    <p:extLst>
+      <p:ext uri="{BB962C8B-B14F-4D97-AF65-F5344CB8AC3E}">
+        <p14:creationId xmlns:p14="http://schemas.microsoft.com/office/powerpoint/2010/main" val="1366424688"/>
       </p:ext>
     </p:extLst>
   </p:cSld>

</xml_diff>